<commit_message>
Practice making Iterator step-3, make ArrayListIterator inner class
</commit_message>
<xml_diff>
--- a/study-note/자바/2022-08-05 내용정리 .pptx
+++ b/study-note/자바/2022-08-05 내용정리 .pptx
@@ -5,13 +5,14 @@
     <p:sldMasterId id="2147483648" r:id="rId1"/>
   </p:sldMasterIdLst>
   <p:notesMasterIdLst>
-    <p:notesMasterId r:id="rId6"/>
+    <p:notesMasterId r:id="rId7"/>
   </p:notesMasterIdLst>
   <p:sldIdLst>
     <p:sldId id="256" r:id="rId2"/>
-    <p:sldId id="276" r:id="rId3"/>
-    <p:sldId id="277" r:id="rId4"/>
-    <p:sldId id="278" r:id="rId5"/>
+    <p:sldId id="277" r:id="rId3"/>
+    <p:sldId id="278" r:id="rId4"/>
+    <p:sldId id="279" r:id="rId5"/>
+    <p:sldId id="280" r:id="rId6"/>
   </p:sldIdLst>
   <p:sldSz cx="12192000" cy="6858000"/>
   <p:notesSz cx="6858000" cy="9144000"/>
@@ -203,7 +204,7 @@
           <a:p>
             <a:fld id="{F526C2EA-361D-406E-8534-6CB21787882E}" type="datetimeFigureOut">
               <a:rPr lang="ko-KR" altLang="en-US" smtClean="0"/>
-              <a:t>2022. 8. 4.</a:t>
+              <a:t>2022. 8. 5.</a:t>
             </a:fld>
             <a:endParaRPr lang="ko-KR" altLang="en-US"/>
           </a:p>
@@ -617,7 +618,7 @@
           <a:p>
             <a:fld id="{E429DD96-549C-4464-A555-B392FBD40474}" type="datetimeFigureOut">
               <a:rPr lang="ko-KR" altLang="en-US" smtClean="0"/>
-              <a:t>2022. 8. 4.</a:t>
+              <a:t>2022. 8. 5.</a:t>
             </a:fld>
             <a:endParaRPr lang="ko-KR" altLang="en-US"/>
           </a:p>
@@ -815,7 +816,7 @@
           <a:p>
             <a:fld id="{E429DD96-549C-4464-A555-B392FBD40474}" type="datetimeFigureOut">
               <a:rPr lang="ko-KR" altLang="en-US" smtClean="0"/>
-              <a:t>2022. 8. 4.</a:t>
+              <a:t>2022. 8. 5.</a:t>
             </a:fld>
             <a:endParaRPr lang="ko-KR" altLang="en-US"/>
           </a:p>
@@ -1023,7 +1024,7 @@
           <a:p>
             <a:fld id="{E429DD96-549C-4464-A555-B392FBD40474}" type="datetimeFigureOut">
               <a:rPr lang="ko-KR" altLang="en-US" smtClean="0"/>
-              <a:t>2022. 8. 4.</a:t>
+              <a:t>2022. 8. 5.</a:t>
             </a:fld>
             <a:endParaRPr lang="ko-KR" altLang="en-US"/>
           </a:p>
@@ -1221,7 +1222,7 @@
           <a:p>
             <a:fld id="{E429DD96-549C-4464-A555-B392FBD40474}" type="datetimeFigureOut">
               <a:rPr lang="ko-KR" altLang="en-US" smtClean="0"/>
-              <a:t>2022. 8. 4.</a:t>
+              <a:t>2022. 8. 5.</a:t>
             </a:fld>
             <a:endParaRPr lang="ko-KR" altLang="en-US"/>
           </a:p>
@@ -1496,7 +1497,7 @@
           <a:p>
             <a:fld id="{E429DD96-549C-4464-A555-B392FBD40474}" type="datetimeFigureOut">
               <a:rPr lang="ko-KR" altLang="en-US" smtClean="0"/>
-              <a:t>2022. 8. 4.</a:t>
+              <a:t>2022. 8. 5.</a:t>
             </a:fld>
             <a:endParaRPr lang="ko-KR" altLang="en-US"/>
           </a:p>
@@ -1761,7 +1762,7 @@
           <a:p>
             <a:fld id="{E429DD96-549C-4464-A555-B392FBD40474}" type="datetimeFigureOut">
               <a:rPr lang="ko-KR" altLang="en-US" smtClean="0"/>
-              <a:t>2022. 8. 4.</a:t>
+              <a:t>2022. 8. 5.</a:t>
             </a:fld>
             <a:endParaRPr lang="ko-KR" altLang="en-US"/>
           </a:p>
@@ -2173,7 +2174,7 @@
           <a:p>
             <a:fld id="{E429DD96-549C-4464-A555-B392FBD40474}" type="datetimeFigureOut">
               <a:rPr lang="ko-KR" altLang="en-US" smtClean="0"/>
-              <a:t>2022. 8. 4.</a:t>
+              <a:t>2022. 8. 5.</a:t>
             </a:fld>
             <a:endParaRPr lang="ko-KR" altLang="en-US"/>
           </a:p>
@@ -2314,7 +2315,7 @@
           <a:p>
             <a:fld id="{E429DD96-549C-4464-A555-B392FBD40474}" type="datetimeFigureOut">
               <a:rPr lang="ko-KR" altLang="en-US" smtClean="0"/>
-              <a:t>2022. 8. 4.</a:t>
+              <a:t>2022. 8. 5.</a:t>
             </a:fld>
             <a:endParaRPr lang="ko-KR" altLang="en-US"/>
           </a:p>
@@ -2427,7 +2428,7 @@
           <a:p>
             <a:fld id="{E429DD96-549C-4464-A555-B392FBD40474}" type="datetimeFigureOut">
               <a:rPr lang="ko-KR" altLang="en-US" smtClean="0"/>
-              <a:t>2022. 8. 4.</a:t>
+              <a:t>2022. 8. 5.</a:t>
             </a:fld>
             <a:endParaRPr lang="ko-KR" altLang="en-US"/>
           </a:p>
@@ -2738,7 +2739,7 @@
           <a:p>
             <a:fld id="{E429DD96-549C-4464-A555-B392FBD40474}" type="datetimeFigureOut">
               <a:rPr lang="ko-KR" altLang="en-US" smtClean="0"/>
-              <a:t>2022. 8. 4.</a:t>
+              <a:t>2022. 8. 5.</a:t>
             </a:fld>
             <a:endParaRPr lang="ko-KR" altLang="en-US"/>
           </a:p>
@@ -3026,7 +3027,7 @@
           <a:p>
             <a:fld id="{E429DD96-549C-4464-A555-B392FBD40474}" type="datetimeFigureOut">
               <a:rPr lang="ko-KR" altLang="en-US" smtClean="0"/>
-              <a:t>2022. 8. 4.</a:t>
+              <a:t>2022. 8. 5.</a:t>
             </a:fld>
             <a:endParaRPr lang="ko-KR" altLang="en-US"/>
           </a:p>
@@ -3267,7 +3268,7 @@
           <a:p>
             <a:fld id="{E429DD96-549C-4464-A555-B392FBD40474}" type="datetimeFigureOut">
               <a:rPr lang="ko-KR" altLang="en-US" smtClean="0"/>
-              <a:t>2022. 8. 4.</a:t>
+              <a:t>2022. 8. 5.</a:t>
             </a:fld>
             <a:endParaRPr lang="ko-KR" altLang="en-US"/>
           </a:p>
@@ -3773,10 +3774,10 @@
       </p:grpSpPr>
       <p:sp>
         <p:nvSpPr>
-          <p:cNvPr id="254" name="직사각형 253">
-            <a:extLst>
-              <a:ext uri="{FF2B5EF4-FFF2-40B4-BE49-F238E27FC236}">
-                <a16:creationId xmlns:a16="http://schemas.microsoft.com/office/drawing/2014/main" id="{4FB5303A-DD5D-7BCA-50B8-EC79040F5254}"/>
+          <p:cNvPr id="4" name="직사각형 3">
+            <a:extLst>
+              <a:ext uri="{FF2B5EF4-FFF2-40B4-BE49-F238E27FC236}">
+                <a16:creationId xmlns:a16="http://schemas.microsoft.com/office/drawing/2014/main" id="{92D1EBF9-BF79-C348-542E-7867D7EFD64A}"/>
               </a:ext>
             </a:extLst>
           </p:cNvPr>
@@ -3785,8 +3786,8 @@
         </p:nvSpPr>
         <p:spPr>
           <a:xfrm>
-            <a:off x="80436" y="2825503"/>
-            <a:ext cx="1324304" cy="1072055"/>
+            <a:off x="1051033" y="804042"/>
+            <a:ext cx="1828801" cy="677917"/>
           </a:xfrm>
           <a:prstGeom prst="rect">
             <a:avLst/>
@@ -3814,15 +3815,8 @@
           <a:p>
             <a:pPr algn="ctr"/>
             <a:r>
-              <a:rPr kumimoji="1" lang="en-US" altLang="ko-Kore-KR" dirty="0"/>
-              <a:t>App</a:t>
-            </a:r>
-          </a:p>
-          <a:p>
-            <a:pPr algn="ctr"/>
-            <a:r>
-              <a:rPr kumimoji="1" lang="en-US" altLang="ko-Kore-KR" dirty="0"/>
-              <a:t>class</a:t>
+              <a:rPr kumimoji="1" lang="en-US" altLang="ko-Kore-KR" dirty="0" err="1"/>
+              <a:t>ArrayList</a:t>
             </a:r>
             <a:endParaRPr kumimoji="1" lang="ko-Kore-KR" altLang="en-US" dirty="0"/>
           </a:p>
@@ -3830,10 +3824,10 @@
       </p:sp>
       <p:sp>
         <p:nvSpPr>
-          <p:cNvPr id="255" name="직사각형 254">
-            <a:extLst>
-              <a:ext uri="{FF2B5EF4-FFF2-40B4-BE49-F238E27FC236}">
-                <a16:creationId xmlns:a16="http://schemas.microsoft.com/office/drawing/2014/main" id="{0A6F8338-B151-0E16-2E74-9780EBE3FDD3}"/>
+          <p:cNvPr id="7" name="직사각형 6">
+            <a:extLst>
+              <a:ext uri="{FF2B5EF4-FFF2-40B4-BE49-F238E27FC236}">
+                <a16:creationId xmlns:a16="http://schemas.microsoft.com/office/drawing/2014/main" id="{FE0F70A9-B948-5105-6F83-EF9C136BC26D}"/>
               </a:ext>
             </a:extLst>
           </p:cNvPr>
@@ -3842,8 +3836,8 @@
         </p:nvSpPr>
         <p:spPr>
           <a:xfrm>
-            <a:off x="2066892" y="411007"/>
-            <a:ext cx="2186152" cy="1072055"/>
+            <a:off x="1051032" y="1839311"/>
+            <a:ext cx="1828801" cy="677917"/>
           </a:xfrm>
           <a:prstGeom prst="rect">
             <a:avLst/>
@@ -3872,76 +3866,18 @@
             <a:pPr algn="ctr"/>
             <a:r>
               <a:rPr kumimoji="1" lang="en-US" altLang="ko-Kore-KR" dirty="0"/>
-              <a:t>&lt;&lt;Concrete&gt;&gt;</a:t>
-            </a:r>
-          </a:p>
-          <a:p>
-            <a:pPr algn="ctr"/>
-            <a:r>
-              <a:rPr kumimoji="1" lang="en-US" altLang="ko-Kore-KR" dirty="0" err="1"/>
-              <a:t>BoardHandler</a:t>
-            </a:r>
-            <a:endParaRPr kumimoji="1" lang="en-US" altLang="ko-Kore-KR" dirty="0"/>
-          </a:p>
-          <a:p>
-            <a:pPr algn="ctr"/>
-            <a:r>
-              <a:rPr kumimoji="1" lang="en-US" altLang="ko-Kore-KR" dirty="0"/>
-              <a:t>class</a:t>
+              <a:t>LinkedList</a:t>
             </a:r>
             <a:endParaRPr kumimoji="1" lang="ko-Kore-KR" altLang="en-US" dirty="0"/>
           </a:p>
         </p:txBody>
       </p:sp>
-      <p:cxnSp>
-        <p:nvCxnSpPr>
-          <p:cNvPr id="256" name="직선 화살표 연결선 255">
-            <a:extLst>
-              <a:ext uri="{FF2B5EF4-FFF2-40B4-BE49-F238E27FC236}">
-                <a16:creationId xmlns:a16="http://schemas.microsoft.com/office/drawing/2014/main" id="{6D2F0346-DEC3-05AF-A6B8-28841234CB35}"/>
-              </a:ext>
-            </a:extLst>
-          </p:cNvPr>
-          <p:cNvCxnSpPr>
-            <a:cxnSpLocks/>
-            <a:stCxn id="254" idx="3"/>
-            <a:endCxn id="255" idx="1"/>
-          </p:cNvCxnSpPr>
-          <p:nvPr/>
-        </p:nvCxnSpPr>
-        <p:spPr>
-          <a:xfrm flipV="1">
-            <a:off x="1404740" y="947035"/>
-            <a:ext cx="662152" cy="2414496"/>
-          </a:xfrm>
-          <a:prstGeom prst="straightConnector1">
-            <a:avLst/>
-          </a:prstGeom>
-          <a:ln>
-            <a:tailEnd type="triangle"/>
-          </a:ln>
-        </p:spPr>
-        <p:style>
-          <a:lnRef idx="3">
-            <a:schemeClr val="accent1"/>
-          </a:lnRef>
-          <a:fillRef idx="0">
-            <a:schemeClr val="accent1"/>
-          </a:fillRef>
-          <a:effectRef idx="2">
-            <a:schemeClr val="accent1"/>
-          </a:effectRef>
-          <a:fontRef idx="minor">
-            <a:schemeClr val="tx1"/>
-          </a:fontRef>
-        </p:style>
-      </p:cxnSp>
-      <p:sp>
-        <p:nvSpPr>
-          <p:cNvPr id="257" name="직사각형 256">
-            <a:extLst>
-              <a:ext uri="{FF2B5EF4-FFF2-40B4-BE49-F238E27FC236}">
-                <a16:creationId xmlns:a16="http://schemas.microsoft.com/office/drawing/2014/main" id="{6D077D42-E2E1-C995-7E8A-371B9B684F66}"/>
+      <p:sp>
+        <p:nvSpPr>
+          <p:cNvPr id="8" name="직사각형 7">
+            <a:extLst>
+              <a:ext uri="{FF2B5EF4-FFF2-40B4-BE49-F238E27FC236}">
+                <a16:creationId xmlns:a16="http://schemas.microsoft.com/office/drawing/2014/main" id="{40FFE58C-54FD-E225-41DA-D6A8FEFDFD88}"/>
               </a:ext>
             </a:extLst>
           </p:cNvPr>
@@ -3950,8 +3886,8 @@
         </p:nvSpPr>
         <p:spPr>
           <a:xfrm>
-            <a:off x="4933311" y="411007"/>
-            <a:ext cx="2186152" cy="1072055"/>
+            <a:off x="1051031" y="2920562"/>
+            <a:ext cx="1828801" cy="677917"/>
           </a:xfrm>
           <a:prstGeom prst="rect">
             <a:avLst/>
@@ -3979,70 +3915,19 @@
           <a:p>
             <a:pPr algn="ctr"/>
             <a:r>
-              <a:rPr kumimoji="1" lang="en-US" altLang="ko-Kore-KR" dirty="0" err="1"/>
-              <a:t>BoardDao</a:t>
-            </a:r>
-            <a:endParaRPr kumimoji="1" lang="en-US" altLang="ko-Kore-KR" dirty="0"/>
-          </a:p>
-          <a:p>
-            <a:pPr algn="ctr"/>
-            <a:r>
               <a:rPr kumimoji="1" lang="en-US" altLang="ko-Kore-KR" dirty="0"/>
-              <a:t>class</a:t>
+              <a:t>Stack</a:t>
             </a:r>
             <a:endParaRPr kumimoji="1" lang="ko-Kore-KR" altLang="en-US" dirty="0"/>
           </a:p>
         </p:txBody>
       </p:sp>
-      <p:cxnSp>
-        <p:nvCxnSpPr>
-          <p:cNvPr id="258" name="직선 화살표 연결선 257">
-            <a:extLst>
-              <a:ext uri="{FF2B5EF4-FFF2-40B4-BE49-F238E27FC236}">
-                <a16:creationId xmlns:a16="http://schemas.microsoft.com/office/drawing/2014/main" id="{F781B8FC-EC7B-E206-1145-CAD546D7938B}"/>
-              </a:ext>
-            </a:extLst>
-          </p:cNvPr>
-          <p:cNvCxnSpPr>
-            <a:cxnSpLocks/>
-            <a:stCxn id="255" idx="3"/>
-            <a:endCxn id="257" idx="1"/>
-          </p:cNvCxnSpPr>
-          <p:nvPr/>
-        </p:nvCxnSpPr>
-        <p:spPr>
-          <a:xfrm>
-            <a:off x="4253044" y="947035"/>
-            <a:ext cx="680267" cy="0"/>
-          </a:xfrm>
-          <a:prstGeom prst="straightConnector1">
-            <a:avLst/>
-          </a:prstGeom>
-          <a:ln>
-            <a:tailEnd type="triangle"/>
-          </a:ln>
-        </p:spPr>
-        <p:style>
-          <a:lnRef idx="3">
-            <a:schemeClr val="accent1"/>
-          </a:lnRef>
-          <a:fillRef idx="0">
-            <a:schemeClr val="accent1"/>
-          </a:fillRef>
-          <a:effectRef idx="2">
-            <a:schemeClr val="accent1"/>
-          </a:effectRef>
-          <a:fontRef idx="minor">
-            <a:schemeClr val="tx1"/>
-          </a:fontRef>
-        </p:style>
-      </p:cxnSp>
-      <p:sp>
-        <p:nvSpPr>
-          <p:cNvPr id="259" name="직사각형 258">
-            <a:extLst>
-              <a:ext uri="{FF2B5EF4-FFF2-40B4-BE49-F238E27FC236}">
-                <a16:creationId xmlns:a16="http://schemas.microsoft.com/office/drawing/2014/main" id="{AE109D66-A818-9C6C-6B86-5496CF1FD60C}"/>
+      <p:sp>
+        <p:nvSpPr>
+          <p:cNvPr id="9" name="직사각형 8">
+            <a:extLst>
+              <a:ext uri="{FF2B5EF4-FFF2-40B4-BE49-F238E27FC236}">
+                <a16:creationId xmlns:a16="http://schemas.microsoft.com/office/drawing/2014/main" id="{7E4B8974-D4EB-E905-0ED3-2D2DDC9365F0}"/>
               </a:ext>
             </a:extLst>
           </p:cNvPr>
@@ -4051,8 +3936,8 @@
         </p:nvSpPr>
         <p:spPr>
           <a:xfrm>
-            <a:off x="8759077" y="363716"/>
-            <a:ext cx="2186152" cy="1072055"/>
+            <a:off x="1051031" y="3955831"/>
+            <a:ext cx="1828801" cy="677917"/>
           </a:xfrm>
           <a:prstGeom prst="rect">
             <a:avLst/>
@@ -4081,68 +3966,18 @@
             <a:pPr algn="ctr"/>
             <a:r>
               <a:rPr kumimoji="1" lang="en-US" altLang="ko-Kore-KR" dirty="0"/>
-              <a:t>&lt;&lt;Interface&gt;&gt;</a:t>
-            </a:r>
-          </a:p>
-          <a:p>
-            <a:pPr algn="ctr"/>
-            <a:r>
-              <a:rPr kumimoji="1" lang="en-US" altLang="ko-Kore-KR" dirty="0"/>
-              <a:t>List</a:t>
+              <a:t>Queue</a:t>
             </a:r>
             <a:endParaRPr kumimoji="1" lang="ko-Kore-KR" altLang="en-US" dirty="0"/>
           </a:p>
         </p:txBody>
       </p:sp>
-      <p:cxnSp>
-        <p:nvCxnSpPr>
-          <p:cNvPr id="260" name="직선 화살표 연결선 259">
-            <a:extLst>
-              <a:ext uri="{FF2B5EF4-FFF2-40B4-BE49-F238E27FC236}">
-                <a16:creationId xmlns:a16="http://schemas.microsoft.com/office/drawing/2014/main" id="{44CDA04F-9E1D-E16E-53B5-3FF53A506A54}"/>
-              </a:ext>
-            </a:extLst>
-          </p:cNvPr>
-          <p:cNvCxnSpPr>
-            <a:cxnSpLocks/>
-            <a:stCxn id="257" idx="3"/>
-            <a:endCxn id="263" idx="1"/>
-          </p:cNvCxnSpPr>
-          <p:nvPr/>
-        </p:nvCxnSpPr>
-        <p:spPr>
-          <a:xfrm>
-            <a:off x="7119463" y="947035"/>
-            <a:ext cx="546538" cy="3469310"/>
-          </a:xfrm>
-          <a:prstGeom prst="straightConnector1">
-            <a:avLst/>
-          </a:prstGeom>
-          <a:ln>
-            <a:tailEnd type="triangle"/>
-          </a:ln>
-        </p:spPr>
-        <p:style>
-          <a:lnRef idx="3">
-            <a:schemeClr val="accent1"/>
-          </a:lnRef>
-          <a:fillRef idx="0">
-            <a:schemeClr val="accent1"/>
-          </a:fillRef>
-          <a:effectRef idx="2">
-            <a:schemeClr val="accent1"/>
-          </a:effectRef>
-          <a:fontRef idx="minor">
-            <a:schemeClr val="tx1"/>
-          </a:fontRef>
-        </p:style>
-      </p:cxnSp>
-      <p:sp>
-        <p:nvSpPr>
-          <p:cNvPr id="261" name="직사각형 260">
-            <a:extLst>
-              <a:ext uri="{FF2B5EF4-FFF2-40B4-BE49-F238E27FC236}">
-                <a16:creationId xmlns:a16="http://schemas.microsoft.com/office/drawing/2014/main" id="{E0179C8D-CF36-16F2-A368-E0512DD6098A}"/>
+      <p:sp>
+        <p:nvSpPr>
+          <p:cNvPr id="10" name="직사각형 9">
+            <a:extLst>
+              <a:ext uri="{FF2B5EF4-FFF2-40B4-BE49-F238E27FC236}">
+                <a16:creationId xmlns:a16="http://schemas.microsoft.com/office/drawing/2014/main" id="{071F57C6-F048-0718-D255-C12E543ACF94}"/>
               </a:ext>
             </a:extLst>
           </p:cNvPr>
@@ -4151,8 +3986,8 @@
         </p:nvSpPr>
         <p:spPr>
           <a:xfrm>
-            <a:off x="8759077" y="1971800"/>
-            <a:ext cx="2186152" cy="1072055"/>
+            <a:off x="1051031" y="5037082"/>
+            <a:ext cx="1828801" cy="677917"/>
           </a:xfrm>
           <a:prstGeom prst="rect">
             <a:avLst/>
@@ -4180,16 +4015,8 @@
           <a:p>
             <a:pPr algn="ctr"/>
             <a:r>
-              <a:rPr kumimoji="1" lang="en-US" altLang="ko-Kore-KR" dirty="0" err="1"/>
-              <a:t>AbstractList</a:t>
-            </a:r>
-            <a:endParaRPr kumimoji="1" lang="en-US" altLang="ko-Kore-KR" dirty="0"/>
-          </a:p>
-          <a:p>
-            <a:pPr algn="ctr"/>
-            <a:r>
               <a:rPr kumimoji="1" lang="en-US" altLang="ko-Kore-KR" dirty="0"/>
-              <a:t>class</a:t>
+              <a:t>HashSet</a:t>
             </a:r>
             <a:endParaRPr kumimoji="1" lang="ko-Kore-KR" altLang="en-US" dirty="0"/>
           </a:p>
@@ -4197,20 +4024,20 @@
       </p:sp>
       <p:sp>
         <p:nvSpPr>
-          <p:cNvPr id="262" name="직사각형 261">
-            <a:extLst>
-              <a:ext uri="{FF2B5EF4-FFF2-40B4-BE49-F238E27FC236}">
-                <a16:creationId xmlns:a16="http://schemas.microsoft.com/office/drawing/2014/main" id="{356EE8D1-938B-71C0-D06F-B3B49294DEC5}"/>
-              </a:ext>
-            </a:extLst>
-          </p:cNvPr>
-          <p:cNvSpPr/>
+          <p:cNvPr id="14" name="TextBox 13">
+            <a:extLst>
+              <a:ext uri="{FF2B5EF4-FFF2-40B4-BE49-F238E27FC236}">
+                <a16:creationId xmlns:a16="http://schemas.microsoft.com/office/drawing/2014/main" id="{12424D5B-79B7-CF39-074C-257708FF3616}"/>
+              </a:ext>
+            </a:extLst>
+          </p:cNvPr>
+          <p:cNvSpPr txBox="1"/>
           <p:nvPr/>
         </p:nvSpPr>
         <p:spPr>
           <a:xfrm>
-            <a:off x="9931536" y="3885422"/>
-            <a:ext cx="2186152" cy="1072055"/>
+            <a:off x="9609083" y="2941638"/>
+            <a:ext cx="1742090" cy="646331"/>
           </a:xfrm>
           <a:prstGeom prst="rect">
             <a:avLst/>
@@ -4218,28 +4045,43 @@
         </p:spPr>
         <p:style>
           <a:lnRef idx="2">
-            <a:schemeClr val="accent1">
-              <a:shade val="50000"/>
-            </a:schemeClr>
+            <a:schemeClr val="accent1"/>
           </a:lnRef>
           <a:fillRef idx="1">
-            <a:schemeClr val="accent1"/>
+            <a:schemeClr val="lt1"/>
           </a:fillRef>
           <a:effectRef idx="0">
             <a:schemeClr val="accent1"/>
           </a:effectRef>
           <a:fontRef idx="minor">
-            <a:schemeClr val="lt1"/>
+            <a:schemeClr val="dk1"/>
           </a:fontRef>
         </p:style>
         <p:txBody>
-          <a:bodyPr rtlCol="0" anchor="ctr"/>
-          <a:lstStyle/>
-          <a:p>
-            <a:pPr algn="ctr"/>
+          <a:bodyPr wrap="square" rtlCol="0">
+            <a:spAutoFit/>
+          </a:bodyPr>
+          <a:lstStyle/>
+          <a:p>
+            <a:r>
+              <a:rPr kumimoji="1" lang="en-US" altLang="ko-Kore-KR" dirty="0"/>
+              <a:t>if(</a:t>
+            </a:r>
             <a:r>
               <a:rPr kumimoji="1" lang="en-US" altLang="ko-Kore-KR" dirty="0" err="1"/>
-              <a:t>ObjectList</a:t>
+              <a:t>hasNext</a:t>
+            </a:r>
+            <a:r>
+              <a:rPr kumimoji="1" lang="en-US" altLang="ko-Kore-KR" dirty="0"/>
+              <a:t>())</a:t>
+            </a:r>
+          </a:p>
+          <a:p>
+            <a:r>
+              <a:rPr kumimoji="1" lang="en-US" altLang="ko-Kore-KR" dirty="0">
+                <a:sym typeface="Wingdings" pitchFamily="2" charset="2"/>
+              </a:rPr>
+              <a:t> next();</a:t>
             </a:r>
             <a:endParaRPr kumimoji="1" lang="ko-Kore-KR" altLang="en-US" dirty="0"/>
           </a:p>
@@ -4247,20 +4089,20 @@
       </p:sp>
       <p:sp>
         <p:nvSpPr>
-          <p:cNvPr id="263" name="직사각형 262">
-            <a:extLst>
-              <a:ext uri="{FF2B5EF4-FFF2-40B4-BE49-F238E27FC236}">
-                <a16:creationId xmlns:a16="http://schemas.microsoft.com/office/drawing/2014/main" id="{AD08EE50-6B41-7A91-5E6D-A190A24F3D85}"/>
-              </a:ext>
-            </a:extLst>
-          </p:cNvPr>
-          <p:cNvSpPr/>
+          <p:cNvPr id="18" name="TextBox 17">
+            <a:extLst>
+              <a:ext uri="{FF2B5EF4-FFF2-40B4-BE49-F238E27FC236}">
+                <a16:creationId xmlns:a16="http://schemas.microsoft.com/office/drawing/2014/main" id="{4F232CB8-A83C-2EFF-9850-CE4F847D5AAA}"/>
+              </a:ext>
+            </a:extLst>
+          </p:cNvPr>
+          <p:cNvSpPr txBox="1"/>
           <p:nvPr/>
         </p:nvSpPr>
         <p:spPr>
           <a:xfrm>
-            <a:off x="7666001" y="3880317"/>
-            <a:ext cx="2186152" cy="1072055"/>
+            <a:off x="4742790" y="2797855"/>
+            <a:ext cx="2706419" cy="923330"/>
           </a:xfrm>
           <a:prstGeom prst="rect">
             <a:avLst/>
@@ -4268,148 +4110,66 @@
         </p:spPr>
         <p:style>
           <a:lnRef idx="2">
-            <a:schemeClr val="accent1">
+            <a:schemeClr val="accent5">
               <a:shade val="50000"/>
             </a:schemeClr>
           </a:lnRef>
           <a:fillRef idx="1">
-            <a:schemeClr val="accent1"/>
+            <a:schemeClr val="accent5"/>
           </a:fillRef>
           <a:effectRef idx="0">
-            <a:schemeClr val="accent1"/>
+            <a:schemeClr val="accent5"/>
           </a:effectRef>
           <a:fontRef idx="minor">
             <a:schemeClr val="lt1"/>
           </a:fontRef>
         </p:style>
         <p:txBody>
-          <a:bodyPr rtlCol="0" anchor="ctr"/>
+          <a:bodyPr wrap="square" rtlCol="0">
+            <a:spAutoFit/>
+          </a:bodyPr>
           <a:lstStyle/>
           <a:p>
             <a:pPr algn="ctr"/>
             <a:r>
+              <a:rPr kumimoji="1" lang="ko-Kore-KR" altLang="en-US" dirty="0"/>
+              <a:t>데이터조회전문가</a:t>
+            </a:r>
+            <a:endParaRPr kumimoji="1" lang="en-US" altLang="ko-Kore-KR" dirty="0"/>
+          </a:p>
+          <a:p>
+            <a:pPr algn="ctr"/>
+            <a:r>
               <a:rPr kumimoji="1" lang="en-US" altLang="ko-Kore-KR" dirty="0"/>
-              <a:t>LinkedList</a:t>
-            </a:r>
+              <a:t>Iterator</a:t>
+            </a:r>
+          </a:p>
+          <a:p>
+            <a:pPr algn="ctr"/>
             <a:endParaRPr kumimoji="1" lang="ko-Kore-KR" altLang="en-US" dirty="0"/>
           </a:p>
         </p:txBody>
       </p:sp>
       <p:cxnSp>
         <p:nvCxnSpPr>
-          <p:cNvPr id="264" name="직선 화살표 연결선 263">
-            <a:extLst>
-              <a:ext uri="{FF2B5EF4-FFF2-40B4-BE49-F238E27FC236}">
-                <a16:creationId xmlns:a16="http://schemas.microsoft.com/office/drawing/2014/main" id="{93FE2817-FC78-B894-F556-94BC94A018A0}"/>
+          <p:cNvPr id="25" name="직선 화살표 연결선 24">
+            <a:extLst>
+              <a:ext uri="{FF2B5EF4-FFF2-40B4-BE49-F238E27FC236}">
+                <a16:creationId xmlns:a16="http://schemas.microsoft.com/office/drawing/2014/main" id="{62F1336D-E9AB-EBCF-BA83-7950534502BA}"/>
               </a:ext>
             </a:extLst>
           </p:cNvPr>
           <p:cNvCxnSpPr>
             <a:cxnSpLocks/>
-            <a:stCxn id="261" idx="0"/>
-            <a:endCxn id="259" idx="2"/>
+            <a:stCxn id="14" idx="1"/>
+            <a:endCxn id="18" idx="3"/>
           </p:cNvCxnSpPr>
           <p:nvPr/>
         </p:nvCxnSpPr>
         <p:spPr>
-          <a:xfrm flipV="1">
-            <a:off x="9852153" y="1435771"/>
-            <a:ext cx="0" cy="536029"/>
-          </a:xfrm>
-          <a:prstGeom prst="straightConnector1">
-            <a:avLst/>
-          </a:prstGeom>
-          <a:ln w="9525" cap="flat" cmpd="sng" algn="ctr">
-            <a:solidFill>
-              <a:schemeClr val="accent1"/>
-            </a:solidFill>
-            <a:prstDash val="dash"/>
-            <a:round/>
-            <a:headEnd type="none" w="med" len="med"/>
-            <a:tailEnd type="none" w="med" len="med"/>
-          </a:ln>
-        </p:spPr>
-        <p:style>
-          <a:lnRef idx="0">
-            <a:scrgbClr r="0" g="0" b="0"/>
-          </a:lnRef>
-          <a:fillRef idx="0">
-            <a:scrgbClr r="0" g="0" b="0"/>
-          </a:fillRef>
-          <a:effectRef idx="0">
-            <a:scrgbClr r="0" g="0" b="0"/>
-          </a:effectRef>
-          <a:fontRef idx="minor">
-            <a:schemeClr val="tx1"/>
-          </a:fontRef>
-        </p:style>
-      </p:cxnSp>
-      <p:sp>
-        <p:nvSpPr>
-          <p:cNvPr id="265" name="삼각형 264">
-            <a:extLst>
-              <a:ext uri="{FF2B5EF4-FFF2-40B4-BE49-F238E27FC236}">
-                <a16:creationId xmlns:a16="http://schemas.microsoft.com/office/drawing/2014/main" id="{D3BD2F8B-9DD0-ABC8-324A-0D6D5B746948}"/>
-              </a:ext>
-            </a:extLst>
-          </p:cNvPr>
-          <p:cNvSpPr/>
-          <p:nvPr/>
-        </p:nvSpPr>
-        <p:spPr>
-          <a:xfrm>
-            <a:off x="9761519" y="1459424"/>
-            <a:ext cx="181267" cy="156265"/>
-          </a:xfrm>
-          <a:prstGeom prst="triangle">
-            <a:avLst/>
-          </a:prstGeom>
-        </p:spPr>
-        <p:style>
-          <a:lnRef idx="2">
-            <a:schemeClr val="accent1">
-              <a:shade val="50000"/>
-            </a:schemeClr>
-          </a:lnRef>
-          <a:fillRef idx="1">
-            <a:schemeClr val="accent1"/>
-          </a:fillRef>
-          <a:effectRef idx="0">
-            <a:schemeClr val="accent1"/>
-          </a:effectRef>
-          <a:fontRef idx="minor">
-            <a:schemeClr val="lt1"/>
-          </a:fontRef>
-        </p:style>
-        <p:txBody>
-          <a:bodyPr rtlCol="0" anchor="ctr"/>
-          <a:lstStyle/>
-          <a:p>
-            <a:pPr algn="ctr"/>
-            <a:endParaRPr kumimoji="1" lang="ko-Kore-KR" altLang="en-US"/>
-          </a:p>
-        </p:txBody>
-      </p:sp>
-      <p:cxnSp>
-        <p:nvCxnSpPr>
-          <p:cNvPr id="266" name="직선 화살표 연결선 265">
-            <a:extLst>
-              <a:ext uri="{FF2B5EF4-FFF2-40B4-BE49-F238E27FC236}">
-                <a16:creationId xmlns:a16="http://schemas.microsoft.com/office/drawing/2014/main" id="{DBB2B144-BC5A-D5F9-FEE6-684CCB796B1A}"/>
-              </a:ext>
-            </a:extLst>
-          </p:cNvPr>
-          <p:cNvCxnSpPr>
-            <a:cxnSpLocks/>
-            <a:stCxn id="262" idx="0"/>
-            <a:endCxn id="261" idx="2"/>
-          </p:cNvCxnSpPr>
-          <p:nvPr/>
-        </p:nvCxnSpPr>
-        <p:spPr>
           <a:xfrm flipH="1" flipV="1">
-            <a:off x="9852153" y="3043855"/>
-            <a:ext cx="1172459" cy="841567"/>
+            <a:off x="7449209" y="3259520"/>
+            <a:ext cx="2159874" cy="5284"/>
           </a:xfrm>
           <a:prstGeom prst="straightConnector1">
             <a:avLst/>
@@ -4435,190 +4195,24 @@
       </p:cxnSp>
       <p:cxnSp>
         <p:nvCxnSpPr>
-          <p:cNvPr id="267" name="직선 화살표 연결선 266">
-            <a:extLst>
-              <a:ext uri="{FF2B5EF4-FFF2-40B4-BE49-F238E27FC236}">
-                <a16:creationId xmlns:a16="http://schemas.microsoft.com/office/drawing/2014/main" id="{A275AF87-B91E-6710-3559-EF8FA3E025FF}"/>
+          <p:cNvPr id="39" name="직선 화살표 연결선 38">
+            <a:extLst>
+              <a:ext uri="{FF2B5EF4-FFF2-40B4-BE49-F238E27FC236}">
+                <a16:creationId xmlns:a16="http://schemas.microsoft.com/office/drawing/2014/main" id="{5E5096CD-9653-6807-6844-6E1B381D5F49}"/>
               </a:ext>
             </a:extLst>
           </p:cNvPr>
           <p:cNvCxnSpPr>
             <a:cxnSpLocks/>
-            <a:stCxn id="263" idx="0"/>
-            <a:endCxn id="261" idx="2"/>
+            <a:stCxn id="4" idx="3"/>
+            <a:endCxn id="18" idx="1"/>
           </p:cNvCxnSpPr>
           <p:nvPr/>
         </p:nvCxnSpPr>
         <p:spPr>
-          <a:xfrm flipV="1">
-            <a:off x="8759077" y="3043855"/>
-            <a:ext cx="1093076" cy="836462"/>
-          </a:xfrm>
-          <a:prstGeom prst="straightConnector1">
-            <a:avLst/>
-          </a:prstGeom>
-          <a:ln>
-            <a:tailEnd type="triangle"/>
-          </a:ln>
-        </p:spPr>
-        <p:style>
-          <a:lnRef idx="3">
-            <a:schemeClr val="accent1"/>
-          </a:lnRef>
-          <a:fillRef idx="0">
-            <a:schemeClr val="accent1"/>
-          </a:fillRef>
-          <a:effectRef idx="2">
-            <a:schemeClr val="accent1"/>
-          </a:effectRef>
-          <a:fontRef idx="minor">
-            <a:schemeClr val="tx1"/>
-          </a:fontRef>
-        </p:style>
-      </p:cxnSp>
-      <p:sp>
-        <p:nvSpPr>
-          <p:cNvPr id="268" name="직사각형 267">
-            <a:extLst>
-              <a:ext uri="{FF2B5EF4-FFF2-40B4-BE49-F238E27FC236}">
-                <a16:creationId xmlns:a16="http://schemas.microsoft.com/office/drawing/2014/main" id="{A9085A46-FBAF-ADCF-F8C8-A43DB8194A44}"/>
-              </a:ext>
-            </a:extLst>
-          </p:cNvPr>
-          <p:cNvSpPr/>
-          <p:nvPr/>
-        </p:nvSpPr>
-        <p:spPr>
           <a:xfrm>
-            <a:off x="1929869" y="4838910"/>
-            <a:ext cx="2186152" cy="1072055"/>
-          </a:xfrm>
-          <a:prstGeom prst="rect">
-            <a:avLst/>
-          </a:prstGeom>
-        </p:spPr>
-        <p:style>
-          <a:lnRef idx="2">
-            <a:schemeClr val="accent1">
-              <a:shade val="50000"/>
-            </a:schemeClr>
-          </a:lnRef>
-          <a:fillRef idx="1">
-            <a:schemeClr val="accent1"/>
-          </a:fillRef>
-          <a:effectRef idx="0">
-            <a:schemeClr val="accent1"/>
-          </a:effectRef>
-          <a:fontRef idx="minor">
-            <a:schemeClr val="lt1"/>
-          </a:fontRef>
-        </p:style>
-        <p:txBody>
-          <a:bodyPr rtlCol="0" anchor="ctr"/>
-          <a:lstStyle/>
-          <a:p>
-            <a:pPr algn="ctr"/>
-            <a:r>
-              <a:rPr kumimoji="1" lang="en-US" altLang="ko-Kore-KR" dirty="0"/>
-              <a:t>&lt;&lt;Concrete&gt;&gt;</a:t>
-            </a:r>
-          </a:p>
-          <a:p>
-            <a:pPr algn="ctr"/>
-            <a:r>
-              <a:rPr kumimoji="1" lang="en-US" altLang="ko-Kore-KR" dirty="0" err="1"/>
-              <a:t>MemberHandler</a:t>
-            </a:r>
-            <a:endParaRPr kumimoji="1" lang="en-US" altLang="ko-Kore-KR" dirty="0"/>
-          </a:p>
-          <a:p>
-            <a:pPr algn="ctr"/>
-            <a:r>
-              <a:rPr kumimoji="1" lang="en-US" altLang="ko-Kore-KR" dirty="0"/>
-              <a:t>class</a:t>
-            </a:r>
-            <a:endParaRPr kumimoji="1" lang="ko-Kore-KR" altLang="en-US" dirty="0"/>
-          </a:p>
-        </p:txBody>
-      </p:sp>
-      <p:sp>
-        <p:nvSpPr>
-          <p:cNvPr id="269" name="직사각형 268">
-            <a:extLst>
-              <a:ext uri="{FF2B5EF4-FFF2-40B4-BE49-F238E27FC236}">
-                <a16:creationId xmlns:a16="http://schemas.microsoft.com/office/drawing/2014/main" id="{BA5F791A-D6C3-F02D-FEDD-EDA479D8C9FA}"/>
-              </a:ext>
-            </a:extLst>
-          </p:cNvPr>
-          <p:cNvSpPr/>
-          <p:nvPr/>
-        </p:nvSpPr>
-        <p:spPr>
-          <a:xfrm>
-            <a:off x="4753663" y="4838909"/>
-            <a:ext cx="2186152" cy="1072055"/>
-          </a:xfrm>
-          <a:prstGeom prst="rect">
-            <a:avLst/>
-          </a:prstGeom>
-        </p:spPr>
-        <p:style>
-          <a:lnRef idx="2">
-            <a:schemeClr val="accent1">
-              <a:shade val="50000"/>
-            </a:schemeClr>
-          </a:lnRef>
-          <a:fillRef idx="1">
-            <a:schemeClr val="accent1"/>
-          </a:fillRef>
-          <a:effectRef idx="0">
-            <a:schemeClr val="accent1"/>
-          </a:effectRef>
-          <a:fontRef idx="minor">
-            <a:schemeClr val="lt1"/>
-          </a:fontRef>
-        </p:style>
-        <p:txBody>
-          <a:bodyPr rtlCol="0" anchor="ctr"/>
-          <a:lstStyle/>
-          <a:p>
-            <a:pPr algn="ctr"/>
-            <a:r>
-              <a:rPr kumimoji="1" lang="en-US" altLang="ko-Kore-KR" dirty="0" err="1"/>
-              <a:t>MemberDao</a:t>
-            </a:r>
-            <a:endParaRPr kumimoji="1" lang="en-US" altLang="ko-Kore-KR" dirty="0"/>
-          </a:p>
-          <a:p>
-            <a:pPr algn="ctr"/>
-            <a:r>
-              <a:rPr kumimoji="1" lang="en-US" altLang="ko-Kore-KR" dirty="0"/>
-              <a:t>class</a:t>
-            </a:r>
-            <a:endParaRPr kumimoji="1" lang="ko-Kore-KR" altLang="en-US" dirty="0"/>
-          </a:p>
-        </p:txBody>
-      </p:sp>
-      <p:cxnSp>
-        <p:nvCxnSpPr>
-          <p:cNvPr id="270" name="직선 화살표 연결선 269">
-            <a:extLst>
-              <a:ext uri="{FF2B5EF4-FFF2-40B4-BE49-F238E27FC236}">
-                <a16:creationId xmlns:a16="http://schemas.microsoft.com/office/drawing/2014/main" id="{F7507426-58AB-AF01-F688-E0BE08FEA337}"/>
-              </a:ext>
-            </a:extLst>
-          </p:cNvPr>
-          <p:cNvCxnSpPr>
-            <a:cxnSpLocks/>
-            <a:stCxn id="268" idx="3"/>
-            <a:endCxn id="269" idx="1"/>
-          </p:cNvCxnSpPr>
-          <p:nvPr/>
-        </p:nvCxnSpPr>
-        <p:spPr>
-          <a:xfrm flipV="1">
-            <a:off x="4116021" y="5374937"/>
-            <a:ext cx="637642" cy="1"/>
+            <a:off x="2879834" y="1143001"/>
+            <a:ext cx="1862956" cy="2116519"/>
           </a:xfrm>
           <a:prstGeom prst="straightConnector1">
             <a:avLst/>
@@ -4644,24 +4238,24 @@
       </p:cxnSp>
       <p:cxnSp>
         <p:nvCxnSpPr>
-          <p:cNvPr id="271" name="직선 화살표 연결선 270">
-            <a:extLst>
-              <a:ext uri="{FF2B5EF4-FFF2-40B4-BE49-F238E27FC236}">
-                <a16:creationId xmlns:a16="http://schemas.microsoft.com/office/drawing/2014/main" id="{2524613A-50F7-5D1B-54AA-C42E0F83004E}"/>
+          <p:cNvPr id="42" name="직선 화살표 연결선 41">
+            <a:extLst>
+              <a:ext uri="{FF2B5EF4-FFF2-40B4-BE49-F238E27FC236}">
+                <a16:creationId xmlns:a16="http://schemas.microsoft.com/office/drawing/2014/main" id="{90F6D2E0-5401-948F-D33B-E53762B575D2}"/>
               </a:ext>
             </a:extLst>
           </p:cNvPr>
           <p:cNvCxnSpPr>
             <a:cxnSpLocks/>
-            <a:stCxn id="254" idx="3"/>
-            <a:endCxn id="268" idx="1"/>
+            <a:stCxn id="7" idx="3"/>
+            <a:endCxn id="18" idx="1"/>
           </p:cNvCxnSpPr>
           <p:nvPr/>
         </p:nvCxnSpPr>
         <p:spPr>
           <a:xfrm>
-            <a:off x="1404740" y="3361531"/>
-            <a:ext cx="525129" cy="2013407"/>
+            <a:off x="2879833" y="2178270"/>
+            <a:ext cx="1862957" cy="1081250"/>
           </a:xfrm>
           <a:prstGeom prst="straightConnector1">
             <a:avLst/>
@@ -4687,382 +4281,24 @@
       </p:cxnSp>
       <p:cxnSp>
         <p:nvCxnSpPr>
-          <p:cNvPr id="272" name="직선 화살표 연결선 271">
-            <a:extLst>
-              <a:ext uri="{FF2B5EF4-FFF2-40B4-BE49-F238E27FC236}">
-                <a16:creationId xmlns:a16="http://schemas.microsoft.com/office/drawing/2014/main" id="{8368E5BE-F33C-97C4-5D8C-2259806E9F65}"/>
+          <p:cNvPr id="45" name="직선 화살표 연결선 44">
+            <a:extLst>
+              <a:ext uri="{FF2B5EF4-FFF2-40B4-BE49-F238E27FC236}">
+                <a16:creationId xmlns:a16="http://schemas.microsoft.com/office/drawing/2014/main" id="{7048F1E5-A227-B9BA-2001-12BA46DBD232}"/>
               </a:ext>
             </a:extLst>
           </p:cNvPr>
           <p:cNvCxnSpPr>
             <a:cxnSpLocks/>
-            <a:stCxn id="269" idx="3"/>
-            <a:endCxn id="263" idx="1"/>
+            <a:stCxn id="8" idx="3"/>
+            <a:endCxn id="18" idx="1"/>
           </p:cNvCxnSpPr>
           <p:nvPr/>
         </p:nvCxnSpPr>
         <p:spPr>
           <a:xfrm flipV="1">
-            <a:off x="6939815" y="4416345"/>
-            <a:ext cx="726186" cy="958592"/>
-          </a:xfrm>
-          <a:prstGeom prst="straightConnector1">
-            <a:avLst/>
-          </a:prstGeom>
-          <a:ln>
-            <a:tailEnd type="triangle"/>
-          </a:ln>
-        </p:spPr>
-        <p:style>
-          <a:lnRef idx="3">
-            <a:schemeClr val="accent1"/>
-          </a:lnRef>
-          <a:fillRef idx="0">
-            <a:schemeClr val="accent1"/>
-          </a:fillRef>
-          <a:effectRef idx="2">
-            <a:schemeClr val="accent1"/>
-          </a:effectRef>
-          <a:fontRef idx="minor">
-            <a:schemeClr val="tx1"/>
-          </a:fontRef>
-        </p:style>
-      </p:cxnSp>
-      <p:sp>
-        <p:nvSpPr>
-          <p:cNvPr id="273" name="직사각형 272">
-            <a:extLst>
-              <a:ext uri="{FF2B5EF4-FFF2-40B4-BE49-F238E27FC236}">
-                <a16:creationId xmlns:a16="http://schemas.microsoft.com/office/drawing/2014/main" id="{D5C87ECC-8953-F000-9519-6A5E2EC9EC49}"/>
-              </a:ext>
-            </a:extLst>
-          </p:cNvPr>
-          <p:cNvSpPr/>
-          <p:nvPr/>
-        </p:nvSpPr>
-        <p:spPr>
-          <a:xfrm>
-            <a:off x="3610579" y="1689270"/>
-            <a:ext cx="2186152" cy="660013"/>
-          </a:xfrm>
-          <a:prstGeom prst="rect">
-            <a:avLst/>
-          </a:prstGeom>
-        </p:spPr>
-        <p:style>
-          <a:lnRef idx="2">
-            <a:schemeClr val="accent1">
-              <a:shade val="50000"/>
-            </a:schemeClr>
-          </a:lnRef>
-          <a:fillRef idx="1">
-            <a:schemeClr val="accent1"/>
-          </a:fillRef>
-          <a:effectRef idx="0">
-            <a:schemeClr val="accent1"/>
-          </a:effectRef>
-          <a:fontRef idx="minor">
-            <a:schemeClr val="lt1"/>
-          </a:fontRef>
-        </p:style>
-        <p:txBody>
-          <a:bodyPr rtlCol="0" anchor="ctr"/>
-          <a:lstStyle/>
-          <a:p>
-            <a:pPr algn="ctr"/>
-            <a:r>
-              <a:rPr kumimoji="1" lang="en-US" altLang="ko-Kore-KR" dirty="0"/>
-              <a:t>&lt;&lt;Interface&gt;&gt;</a:t>
-            </a:r>
-          </a:p>
-          <a:p>
-            <a:pPr algn="ctr"/>
-            <a:r>
-              <a:rPr kumimoji="1" lang="en-US" altLang="ko-Kore-KR" dirty="0"/>
-              <a:t>Handler</a:t>
-            </a:r>
-            <a:endParaRPr kumimoji="1" lang="ko-Kore-KR" altLang="en-US" dirty="0"/>
-          </a:p>
-        </p:txBody>
-      </p:sp>
-      <p:cxnSp>
-        <p:nvCxnSpPr>
-          <p:cNvPr id="276" name="직선 화살표 연결선 275">
-            <a:extLst>
-              <a:ext uri="{FF2B5EF4-FFF2-40B4-BE49-F238E27FC236}">
-                <a16:creationId xmlns:a16="http://schemas.microsoft.com/office/drawing/2014/main" id="{6F096E37-8544-513F-9C8F-2203B577953A}"/>
-              </a:ext>
-            </a:extLst>
-          </p:cNvPr>
-          <p:cNvCxnSpPr>
-            <a:cxnSpLocks/>
-            <a:stCxn id="273" idx="2"/>
-            <a:endCxn id="279" idx="0"/>
-          </p:cNvCxnSpPr>
-          <p:nvPr/>
-        </p:nvCxnSpPr>
-        <p:spPr>
-          <a:xfrm>
-            <a:off x="4703655" y="2349283"/>
-            <a:ext cx="0" cy="408594"/>
-          </a:xfrm>
-          <a:prstGeom prst="straightConnector1">
-            <a:avLst/>
-          </a:prstGeom>
-          <a:ln w="9525" cap="flat" cmpd="sng" algn="ctr">
-            <a:solidFill>
-              <a:schemeClr val="accent1"/>
-            </a:solidFill>
-            <a:prstDash val="dash"/>
-            <a:round/>
-            <a:headEnd type="none" w="med" len="med"/>
-            <a:tailEnd type="none" w="med" len="med"/>
-          </a:ln>
-        </p:spPr>
-        <p:style>
-          <a:lnRef idx="0">
-            <a:scrgbClr r="0" g="0" b="0"/>
-          </a:lnRef>
-          <a:fillRef idx="0">
-            <a:scrgbClr r="0" g="0" b="0"/>
-          </a:fillRef>
-          <a:effectRef idx="0">
-            <a:scrgbClr r="0" g="0" b="0"/>
-          </a:effectRef>
-          <a:fontRef idx="minor">
-            <a:schemeClr val="tx1"/>
-          </a:fontRef>
-        </p:style>
-      </p:cxnSp>
-      <p:sp>
-        <p:nvSpPr>
-          <p:cNvPr id="277" name="삼각형 276">
-            <a:extLst>
-              <a:ext uri="{FF2B5EF4-FFF2-40B4-BE49-F238E27FC236}">
-                <a16:creationId xmlns:a16="http://schemas.microsoft.com/office/drawing/2014/main" id="{775A352E-6D1F-4D89-4220-6358CCFD519F}"/>
-              </a:ext>
-            </a:extLst>
-          </p:cNvPr>
-          <p:cNvSpPr/>
-          <p:nvPr/>
-        </p:nvSpPr>
-        <p:spPr>
-          <a:xfrm>
-            <a:off x="4628548" y="2363169"/>
-            <a:ext cx="181267" cy="156265"/>
-          </a:xfrm>
-          <a:prstGeom prst="triangle">
-            <a:avLst/>
-          </a:prstGeom>
-        </p:spPr>
-        <p:style>
-          <a:lnRef idx="2">
-            <a:schemeClr val="accent1">
-              <a:shade val="50000"/>
-            </a:schemeClr>
-          </a:lnRef>
-          <a:fillRef idx="1">
-            <a:schemeClr val="accent1"/>
-          </a:fillRef>
-          <a:effectRef idx="0">
-            <a:schemeClr val="accent1"/>
-          </a:effectRef>
-          <a:fontRef idx="minor">
-            <a:schemeClr val="lt1"/>
-          </a:fontRef>
-        </p:style>
-        <p:txBody>
-          <a:bodyPr rtlCol="0" anchor="ctr"/>
-          <a:lstStyle/>
-          <a:p>
-            <a:pPr algn="ctr"/>
-            <a:endParaRPr kumimoji="1" lang="ko-Kore-KR" altLang="en-US"/>
-          </a:p>
-        </p:txBody>
-      </p:sp>
-      <p:sp>
-        <p:nvSpPr>
-          <p:cNvPr id="8" name="TextBox 7">
-            <a:extLst>
-              <a:ext uri="{FF2B5EF4-FFF2-40B4-BE49-F238E27FC236}">
-                <a16:creationId xmlns:a16="http://schemas.microsoft.com/office/drawing/2014/main" id="{F337DC02-9690-5ABE-D634-AD7CCBE96AD3}"/>
-              </a:ext>
-            </a:extLst>
-          </p:cNvPr>
-          <p:cNvSpPr txBox="1"/>
-          <p:nvPr/>
-        </p:nvSpPr>
-        <p:spPr>
-          <a:xfrm>
-            <a:off x="1168257" y="2052965"/>
-            <a:ext cx="1135118" cy="369332"/>
-          </a:xfrm>
-          <a:prstGeom prst="rect">
-            <a:avLst/>
-          </a:prstGeom>
-        </p:spPr>
-        <p:style>
-          <a:lnRef idx="2">
-            <a:schemeClr val="accent1"/>
-          </a:lnRef>
-          <a:fillRef idx="1">
-            <a:schemeClr val="lt1"/>
-          </a:fillRef>
-          <a:effectRef idx="0">
-            <a:schemeClr val="accent1"/>
-          </a:effectRef>
-          <a:fontRef idx="minor">
-            <a:schemeClr val="dk1"/>
-          </a:fontRef>
-        </p:style>
-        <p:txBody>
-          <a:bodyPr wrap="square" rtlCol="0">
-            <a:spAutoFit/>
-          </a:bodyPr>
-          <a:lstStyle/>
-          <a:p>
-            <a:r>
-              <a:rPr kumimoji="1" lang="en-US" altLang="ko-Kore-KR" dirty="0"/>
-              <a:t>execute()</a:t>
-            </a:r>
-            <a:endParaRPr kumimoji="1" lang="ko-Kore-KR" altLang="en-US" dirty="0"/>
-          </a:p>
-        </p:txBody>
-      </p:sp>
-      <p:sp>
-        <p:nvSpPr>
-          <p:cNvPr id="278" name="TextBox 277">
-            <a:extLst>
-              <a:ext uri="{FF2B5EF4-FFF2-40B4-BE49-F238E27FC236}">
-                <a16:creationId xmlns:a16="http://schemas.microsoft.com/office/drawing/2014/main" id="{D689FD42-1A5B-15D3-1D58-9248BD37060E}"/>
-              </a:ext>
-            </a:extLst>
-          </p:cNvPr>
-          <p:cNvSpPr txBox="1"/>
-          <p:nvPr/>
-        </p:nvSpPr>
-        <p:spPr>
-          <a:xfrm>
-            <a:off x="1097079" y="4188599"/>
-            <a:ext cx="1135118" cy="369332"/>
-          </a:xfrm>
-          <a:prstGeom prst="rect">
-            <a:avLst/>
-          </a:prstGeom>
-        </p:spPr>
-        <p:style>
-          <a:lnRef idx="2">
-            <a:schemeClr val="accent1"/>
-          </a:lnRef>
-          <a:fillRef idx="1">
-            <a:schemeClr val="lt1"/>
-          </a:fillRef>
-          <a:effectRef idx="0">
-            <a:schemeClr val="accent1"/>
-          </a:effectRef>
-          <a:fontRef idx="minor">
-            <a:schemeClr val="dk1"/>
-          </a:fontRef>
-        </p:style>
-        <p:txBody>
-          <a:bodyPr wrap="square" rtlCol="0">
-            <a:spAutoFit/>
-          </a:bodyPr>
-          <a:lstStyle/>
-          <a:p>
-            <a:r>
-              <a:rPr kumimoji="1" lang="en-US" altLang="ko-Kore-KR" dirty="0"/>
-              <a:t>execute()</a:t>
-            </a:r>
-            <a:endParaRPr kumimoji="1" lang="ko-Kore-KR" altLang="en-US" dirty="0"/>
-          </a:p>
-        </p:txBody>
-      </p:sp>
-      <p:sp>
-        <p:nvSpPr>
-          <p:cNvPr id="279" name="직사각형 278">
-            <a:extLst>
-              <a:ext uri="{FF2B5EF4-FFF2-40B4-BE49-F238E27FC236}">
-                <a16:creationId xmlns:a16="http://schemas.microsoft.com/office/drawing/2014/main" id="{EDE636EB-7FE0-2E30-8F6A-025F277F0F2B}"/>
-              </a:ext>
-            </a:extLst>
-          </p:cNvPr>
-          <p:cNvSpPr/>
-          <p:nvPr/>
-        </p:nvSpPr>
-        <p:spPr>
-          <a:xfrm>
-            <a:off x="3610579" y="2757877"/>
-            <a:ext cx="2186152" cy="1072055"/>
-          </a:xfrm>
-          <a:prstGeom prst="rect">
-            <a:avLst/>
-          </a:prstGeom>
-        </p:spPr>
-        <p:style>
-          <a:lnRef idx="2">
-            <a:schemeClr val="accent1">
-              <a:shade val="50000"/>
-            </a:schemeClr>
-          </a:lnRef>
-          <a:fillRef idx="1">
-            <a:schemeClr val="accent1"/>
-          </a:fillRef>
-          <a:effectRef idx="0">
-            <a:schemeClr val="accent1"/>
-          </a:effectRef>
-          <a:fontRef idx="minor">
-            <a:schemeClr val="lt1"/>
-          </a:fontRef>
-        </p:style>
-        <p:txBody>
-          <a:bodyPr rtlCol="0" anchor="ctr"/>
-          <a:lstStyle/>
-          <a:p>
-            <a:pPr algn="ctr"/>
-            <a:r>
-              <a:rPr kumimoji="1" lang="en-US" altLang="ko-Kore-KR" dirty="0"/>
-              <a:t>&lt;&lt;abstract&gt;&gt;</a:t>
-            </a:r>
-          </a:p>
-          <a:p>
-            <a:pPr algn="ctr"/>
-            <a:r>
-              <a:rPr kumimoji="1" lang="en-US" altLang="ko-Kore-KR" dirty="0" err="1"/>
-              <a:t>AbstractHandler</a:t>
-            </a:r>
-            <a:endParaRPr kumimoji="1" lang="en-US" altLang="ko-Kore-KR" dirty="0"/>
-          </a:p>
-          <a:p>
-            <a:pPr algn="ctr"/>
-            <a:r>
-              <a:rPr kumimoji="1" lang="en-US" altLang="ko-Kore-KR" dirty="0"/>
-              <a:t>class</a:t>
-            </a:r>
-            <a:endParaRPr kumimoji="1" lang="ko-Kore-KR" altLang="en-US" dirty="0"/>
-          </a:p>
-        </p:txBody>
-      </p:sp>
-      <p:cxnSp>
-        <p:nvCxnSpPr>
-          <p:cNvPr id="280" name="직선 화살표 연결선 279">
-            <a:extLst>
-              <a:ext uri="{FF2B5EF4-FFF2-40B4-BE49-F238E27FC236}">
-                <a16:creationId xmlns:a16="http://schemas.microsoft.com/office/drawing/2014/main" id="{2D5942BD-3B2D-0FD4-C08D-59F4C74CEC09}"/>
-              </a:ext>
-            </a:extLst>
-          </p:cNvPr>
-          <p:cNvCxnSpPr>
-            <a:cxnSpLocks/>
-            <a:stCxn id="255" idx="2"/>
-            <a:endCxn id="279" idx="1"/>
-          </p:cNvCxnSpPr>
-          <p:nvPr/>
-        </p:nvCxnSpPr>
-        <p:spPr>
-          <a:xfrm>
-            <a:off x="3159968" y="1483062"/>
-            <a:ext cx="450611" cy="1810843"/>
+            <a:off x="2879832" y="3259520"/>
+            <a:ext cx="1862958" cy="1"/>
           </a:xfrm>
           <a:prstGeom prst="straightConnector1">
             <a:avLst/>
@@ -5088,24 +4324,24 @@
       </p:cxnSp>
       <p:cxnSp>
         <p:nvCxnSpPr>
-          <p:cNvPr id="283" name="직선 화살표 연결선 282">
-            <a:extLst>
-              <a:ext uri="{FF2B5EF4-FFF2-40B4-BE49-F238E27FC236}">
-                <a16:creationId xmlns:a16="http://schemas.microsoft.com/office/drawing/2014/main" id="{51598370-5178-B09C-C226-F60A6EAB8168}"/>
+          <p:cNvPr id="49" name="직선 화살표 연결선 48">
+            <a:extLst>
+              <a:ext uri="{FF2B5EF4-FFF2-40B4-BE49-F238E27FC236}">
+                <a16:creationId xmlns:a16="http://schemas.microsoft.com/office/drawing/2014/main" id="{A5BF1855-8B5C-A3C6-7C1F-E0FFEDB8477D}"/>
               </a:ext>
             </a:extLst>
           </p:cNvPr>
           <p:cNvCxnSpPr>
             <a:cxnSpLocks/>
-            <a:stCxn id="268" idx="0"/>
-            <a:endCxn id="279" idx="1"/>
+            <a:stCxn id="9" idx="3"/>
+            <a:endCxn id="18" idx="1"/>
           </p:cNvCxnSpPr>
           <p:nvPr/>
         </p:nvCxnSpPr>
         <p:spPr>
           <a:xfrm flipV="1">
-            <a:off x="3022945" y="3293905"/>
-            <a:ext cx="587634" cy="1545005"/>
+            <a:off x="2879832" y="3259520"/>
+            <a:ext cx="1862958" cy="1035270"/>
           </a:xfrm>
           <a:prstGeom prst="straightConnector1">
             <a:avLst/>
@@ -5129,414 +4365,26 @@
           </a:fontRef>
         </p:style>
       </p:cxnSp>
-      <p:sp>
-        <p:nvSpPr>
-          <p:cNvPr id="295" name="TextBox 294">
-            <a:extLst>
-              <a:ext uri="{FF2B5EF4-FFF2-40B4-BE49-F238E27FC236}">
-                <a16:creationId xmlns:a16="http://schemas.microsoft.com/office/drawing/2014/main" id="{FBD75410-B048-FCB2-5351-7D0DC75CD11B}"/>
-              </a:ext>
-            </a:extLst>
-          </p:cNvPr>
-          <p:cNvSpPr txBox="1"/>
-          <p:nvPr/>
-        </p:nvSpPr>
-        <p:spPr>
-          <a:xfrm>
-            <a:off x="3636698" y="3943611"/>
-            <a:ext cx="2186152" cy="646331"/>
-          </a:xfrm>
-          <a:prstGeom prst="rect">
-            <a:avLst/>
-          </a:prstGeom>
-        </p:spPr>
-        <p:style>
-          <a:lnRef idx="2">
-            <a:schemeClr val="accent1"/>
-          </a:lnRef>
-          <a:fillRef idx="1">
-            <a:schemeClr val="lt1"/>
-          </a:fillRef>
-          <a:effectRef idx="0">
-            <a:schemeClr val="accent1"/>
-          </a:effectRef>
-          <a:fontRef idx="minor">
-            <a:schemeClr val="dk1"/>
-          </a:fontRef>
-        </p:style>
-        <p:txBody>
-          <a:bodyPr wrap="square" rtlCol="0">
-            <a:spAutoFit/>
-          </a:bodyPr>
-          <a:lstStyle/>
-          <a:p>
-            <a:pPr marL="285750" indent="-285750">
-              <a:buFont typeface="Arial" panose="020B0604020202020204" pitchFamily="34" charset="0"/>
-              <a:buChar char="•"/>
-            </a:pPr>
-            <a:r>
-              <a:rPr kumimoji="1" lang="en-US" altLang="ko-Kore-KR" dirty="0"/>
-              <a:t>execute(){}</a:t>
-            </a:r>
-          </a:p>
-          <a:p>
-            <a:pPr marL="285750" indent="-285750">
-              <a:buFont typeface="Arial" panose="020B0604020202020204" pitchFamily="34" charset="0"/>
-              <a:buChar char="•"/>
-            </a:pPr>
-            <a:r>
-              <a:rPr kumimoji="1" lang="en-US" altLang="ko-Kore-KR" dirty="0"/>
-              <a:t>service();</a:t>
-            </a:r>
-            <a:endParaRPr kumimoji="1" lang="ko-Kore-KR" altLang="en-US" dirty="0"/>
-          </a:p>
-        </p:txBody>
-      </p:sp>
-      <p:sp>
-        <p:nvSpPr>
-          <p:cNvPr id="301" name="TextBox 300">
-            <a:extLst>
-              <a:ext uri="{FF2B5EF4-FFF2-40B4-BE49-F238E27FC236}">
-                <a16:creationId xmlns:a16="http://schemas.microsoft.com/office/drawing/2014/main" id="{EBE36593-AFC7-FE82-0AEB-D1C8390BD8F1}"/>
-              </a:ext>
-            </a:extLst>
-          </p:cNvPr>
-          <p:cNvSpPr txBox="1"/>
-          <p:nvPr/>
-        </p:nvSpPr>
-        <p:spPr>
-          <a:xfrm>
-            <a:off x="1929869" y="6049629"/>
-            <a:ext cx="2186152" cy="369332"/>
-          </a:xfrm>
-          <a:prstGeom prst="rect">
-            <a:avLst/>
-          </a:prstGeom>
-        </p:spPr>
-        <p:style>
-          <a:lnRef idx="2">
-            <a:schemeClr val="accent1"/>
-          </a:lnRef>
-          <a:fillRef idx="1">
-            <a:schemeClr val="lt1"/>
-          </a:fillRef>
-          <a:effectRef idx="0">
-            <a:schemeClr val="accent1"/>
-          </a:effectRef>
-          <a:fontRef idx="minor">
-            <a:schemeClr val="dk1"/>
-          </a:fontRef>
-        </p:style>
-        <p:txBody>
-          <a:bodyPr wrap="square" rtlCol="0">
-            <a:spAutoFit/>
-          </a:bodyPr>
-          <a:lstStyle/>
-          <a:p>
-            <a:pPr marL="285750" indent="-285750">
-              <a:buFont typeface="Arial" panose="020B0604020202020204" pitchFamily="34" charset="0"/>
-              <a:buChar char="•"/>
-            </a:pPr>
-            <a:r>
-              <a:rPr kumimoji="1" lang="en-US" altLang="ko-Kore-KR" dirty="0"/>
-              <a:t>service() {};</a:t>
-            </a:r>
-            <a:endParaRPr kumimoji="1" lang="ko-Kore-KR" altLang="en-US" dirty="0"/>
-          </a:p>
-        </p:txBody>
-      </p:sp>
-      <p:sp>
-        <p:nvSpPr>
-          <p:cNvPr id="302" name="TextBox 301">
-            <a:extLst>
-              <a:ext uri="{FF2B5EF4-FFF2-40B4-BE49-F238E27FC236}">
-                <a16:creationId xmlns:a16="http://schemas.microsoft.com/office/drawing/2014/main" id="{325E2C5D-98D2-359C-05FE-7E866F25CCDF}"/>
-              </a:ext>
-            </a:extLst>
-          </p:cNvPr>
-          <p:cNvSpPr txBox="1"/>
-          <p:nvPr/>
-        </p:nvSpPr>
-        <p:spPr>
-          <a:xfrm>
-            <a:off x="4753663" y="6049629"/>
-            <a:ext cx="2186152" cy="369332"/>
-          </a:xfrm>
-          <a:prstGeom prst="rect">
-            <a:avLst/>
-          </a:prstGeom>
-        </p:spPr>
-        <p:style>
-          <a:lnRef idx="2">
-            <a:schemeClr val="accent1"/>
-          </a:lnRef>
-          <a:fillRef idx="1">
-            <a:schemeClr val="lt1"/>
-          </a:fillRef>
-          <a:effectRef idx="0">
-            <a:schemeClr val="accent1"/>
-          </a:effectRef>
-          <a:fontRef idx="minor">
-            <a:schemeClr val="dk1"/>
-          </a:fontRef>
-        </p:style>
-        <p:txBody>
-          <a:bodyPr wrap="square" rtlCol="0">
-            <a:spAutoFit/>
-          </a:bodyPr>
-          <a:lstStyle/>
-          <a:p>
-            <a:pPr marL="285750" indent="-285750">
-              <a:buFont typeface="Arial" panose="020B0604020202020204" pitchFamily="34" charset="0"/>
-              <a:buChar char="•"/>
-            </a:pPr>
-            <a:r>
-              <a:rPr kumimoji="1" lang="en-US" altLang="ko-Kore-KR" dirty="0"/>
-              <a:t>service() {};</a:t>
-            </a:r>
-            <a:endParaRPr kumimoji="1" lang="ko-Kore-KR" altLang="en-US" dirty="0"/>
-          </a:p>
-        </p:txBody>
-      </p:sp>
-      <p:sp>
-        <p:nvSpPr>
-          <p:cNvPr id="303" name="타원 302">
-            <a:extLst>
-              <a:ext uri="{FF2B5EF4-FFF2-40B4-BE49-F238E27FC236}">
-                <a16:creationId xmlns:a16="http://schemas.microsoft.com/office/drawing/2014/main" id="{10F4AE27-1F80-3AF9-CCC8-3F8160BF8772}"/>
-              </a:ext>
-            </a:extLst>
-          </p:cNvPr>
-          <p:cNvSpPr/>
-          <p:nvPr/>
-        </p:nvSpPr>
-        <p:spPr>
-          <a:xfrm>
-            <a:off x="2701160" y="2630262"/>
-            <a:ext cx="3871766" cy="2069982"/>
-          </a:xfrm>
-          <a:prstGeom prst="ellipse">
-            <a:avLst/>
-          </a:prstGeom>
-          <a:noFill/>
-          <a:ln w="41275">
-            <a:solidFill>
-              <a:schemeClr val="accent2">
-                <a:alpha val="64000"/>
-              </a:schemeClr>
-            </a:solidFill>
-          </a:ln>
-        </p:spPr>
-        <p:style>
-          <a:lnRef idx="2">
-            <a:schemeClr val="accent1">
-              <a:shade val="50000"/>
-            </a:schemeClr>
-          </a:lnRef>
-          <a:fillRef idx="1">
-            <a:schemeClr val="accent1"/>
-          </a:fillRef>
-          <a:effectRef idx="0">
-            <a:schemeClr val="accent1"/>
-          </a:effectRef>
-          <a:fontRef idx="minor">
-            <a:schemeClr val="lt1"/>
-          </a:fontRef>
-        </p:style>
-        <p:txBody>
-          <a:bodyPr rtlCol="0" anchor="ctr"/>
-          <a:lstStyle/>
-          <a:p>
-            <a:pPr algn="ctr"/>
-            <a:endParaRPr kumimoji="1" lang="ko-Kore-KR" altLang="en-US" dirty="0"/>
-          </a:p>
-        </p:txBody>
-      </p:sp>
-      <p:sp>
-        <p:nvSpPr>
-          <p:cNvPr id="309" name="TextBox 308">
-            <a:extLst>
-              <a:ext uri="{FF2B5EF4-FFF2-40B4-BE49-F238E27FC236}">
-                <a16:creationId xmlns:a16="http://schemas.microsoft.com/office/drawing/2014/main" id="{EA559852-BE11-5727-0119-2328E83159EC}"/>
-              </a:ext>
-            </a:extLst>
-          </p:cNvPr>
-          <p:cNvSpPr txBox="1"/>
-          <p:nvPr/>
-        </p:nvSpPr>
-        <p:spPr>
-          <a:xfrm>
-            <a:off x="7461169" y="5374936"/>
-            <a:ext cx="3484060" cy="369332"/>
-          </a:xfrm>
-          <a:prstGeom prst="rect">
-            <a:avLst/>
-          </a:prstGeom>
-        </p:spPr>
-        <p:style>
-          <a:lnRef idx="2">
-            <a:schemeClr val="accent2"/>
-          </a:lnRef>
-          <a:fillRef idx="1">
-            <a:schemeClr val="lt1"/>
-          </a:fillRef>
-          <a:effectRef idx="0">
-            <a:schemeClr val="accent2"/>
-          </a:effectRef>
-          <a:fontRef idx="minor">
-            <a:schemeClr val="dk1"/>
-          </a:fontRef>
-        </p:style>
-        <p:txBody>
-          <a:bodyPr wrap="square" rtlCol="0">
-            <a:spAutoFit/>
-          </a:bodyPr>
-          <a:lstStyle/>
-          <a:p>
-            <a:r>
-              <a:rPr kumimoji="1" lang="en-US" altLang="ko-Kore-KR" dirty="0"/>
-              <a:t>Template Method Pattern </a:t>
-            </a:r>
-            <a:r>
-              <a:rPr kumimoji="1" lang="ko-KR" altLang="en-US" dirty="0"/>
-              <a:t>적용</a:t>
-            </a:r>
-            <a:r>
-              <a:rPr kumimoji="1" lang="en-US" altLang="ko-KR" dirty="0"/>
-              <a:t>!</a:t>
-            </a:r>
-            <a:endParaRPr kumimoji="1" lang="ko-Kore-KR" altLang="en-US" dirty="0"/>
-          </a:p>
-        </p:txBody>
-      </p:sp>
-      <p:sp>
-        <p:nvSpPr>
-          <p:cNvPr id="314" name="타원 313">
-            <a:extLst>
-              <a:ext uri="{FF2B5EF4-FFF2-40B4-BE49-F238E27FC236}">
-                <a16:creationId xmlns:a16="http://schemas.microsoft.com/office/drawing/2014/main" id="{BB11805B-CE11-4DDD-3EFD-3DB769B72EE3}"/>
-              </a:ext>
-            </a:extLst>
-          </p:cNvPr>
-          <p:cNvSpPr/>
-          <p:nvPr/>
-        </p:nvSpPr>
-        <p:spPr>
-          <a:xfrm>
-            <a:off x="1662337" y="4826245"/>
-            <a:ext cx="2611613" cy="1836045"/>
-          </a:xfrm>
-          <a:prstGeom prst="ellipse">
-            <a:avLst/>
-          </a:prstGeom>
-          <a:noFill/>
-          <a:ln w="41275">
-            <a:solidFill>
-              <a:schemeClr val="accent2">
-                <a:alpha val="64000"/>
-              </a:schemeClr>
-            </a:solidFill>
-          </a:ln>
-        </p:spPr>
-        <p:style>
-          <a:lnRef idx="2">
-            <a:schemeClr val="accent1">
-              <a:shade val="50000"/>
-            </a:schemeClr>
-          </a:lnRef>
-          <a:fillRef idx="1">
-            <a:schemeClr val="accent1"/>
-          </a:fillRef>
-          <a:effectRef idx="0">
-            <a:schemeClr val="accent1"/>
-          </a:effectRef>
-          <a:fontRef idx="minor">
-            <a:schemeClr val="lt1"/>
-          </a:fontRef>
-        </p:style>
-        <p:txBody>
-          <a:bodyPr rtlCol="0" anchor="ctr"/>
-          <a:lstStyle/>
-          <a:p>
-            <a:pPr algn="ctr"/>
-            <a:endParaRPr kumimoji="1" lang="ko-Kore-KR" altLang="en-US" dirty="0"/>
-          </a:p>
-        </p:txBody>
-      </p:sp>
-      <p:sp>
-        <p:nvSpPr>
-          <p:cNvPr id="315" name="타원 314">
-            <a:extLst>
-              <a:ext uri="{FF2B5EF4-FFF2-40B4-BE49-F238E27FC236}">
-                <a16:creationId xmlns:a16="http://schemas.microsoft.com/office/drawing/2014/main" id="{FC24E273-5698-F21D-482B-6DDD7B2AC8A2}"/>
-              </a:ext>
-            </a:extLst>
-          </p:cNvPr>
-          <p:cNvSpPr/>
-          <p:nvPr/>
-        </p:nvSpPr>
-        <p:spPr>
-          <a:xfrm>
-            <a:off x="4607544" y="4826245"/>
-            <a:ext cx="2611613" cy="1836045"/>
-          </a:xfrm>
-          <a:prstGeom prst="ellipse">
-            <a:avLst/>
-          </a:prstGeom>
-          <a:noFill/>
-          <a:ln w="41275">
-            <a:solidFill>
-              <a:schemeClr val="accent2">
-                <a:alpha val="64000"/>
-              </a:schemeClr>
-            </a:solidFill>
-          </a:ln>
-        </p:spPr>
-        <p:style>
-          <a:lnRef idx="2">
-            <a:schemeClr val="accent1">
-              <a:shade val="50000"/>
-            </a:schemeClr>
-          </a:lnRef>
-          <a:fillRef idx="1">
-            <a:schemeClr val="accent1"/>
-          </a:fillRef>
-          <a:effectRef idx="0">
-            <a:schemeClr val="accent1"/>
-          </a:effectRef>
-          <a:fontRef idx="minor">
-            <a:schemeClr val="lt1"/>
-          </a:fontRef>
-        </p:style>
-        <p:txBody>
-          <a:bodyPr rtlCol="0" anchor="ctr"/>
-          <a:lstStyle/>
-          <a:p>
-            <a:pPr algn="ctr"/>
-            <a:endParaRPr kumimoji="1" lang="ko-Kore-KR" altLang="en-US" dirty="0"/>
-          </a:p>
-        </p:txBody>
-      </p:sp>
       <p:cxnSp>
         <p:nvCxnSpPr>
-          <p:cNvPr id="317" name="직선 화살표 연결선 316">
-            <a:extLst>
-              <a:ext uri="{FF2B5EF4-FFF2-40B4-BE49-F238E27FC236}">
-                <a16:creationId xmlns:a16="http://schemas.microsoft.com/office/drawing/2014/main" id="{620C5F69-13E5-4537-AA7D-3F47D08C611E}"/>
+          <p:cNvPr id="52" name="직선 화살표 연결선 51">
+            <a:extLst>
+              <a:ext uri="{FF2B5EF4-FFF2-40B4-BE49-F238E27FC236}">
+                <a16:creationId xmlns:a16="http://schemas.microsoft.com/office/drawing/2014/main" id="{3EE4050A-08E5-8012-FD20-D7EE5F115948}"/>
               </a:ext>
             </a:extLst>
           </p:cNvPr>
           <p:cNvCxnSpPr>
             <a:cxnSpLocks/>
-            <a:stCxn id="303" idx="4"/>
-            <a:endCxn id="314" idx="7"/>
+            <a:stCxn id="10" idx="3"/>
+            <a:endCxn id="18" idx="1"/>
           </p:cNvCxnSpPr>
           <p:nvPr/>
         </p:nvCxnSpPr>
         <p:spPr>
-          <a:xfrm flipH="1">
-            <a:off x="3891488" y="4700244"/>
-            <a:ext cx="745555" cy="394884"/>
+          <a:xfrm flipV="1">
+            <a:off x="2879832" y="3259520"/>
+            <a:ext cx="1862958" cy="2116521"/>
           </a:xfrm>
           <a:prstGeom prst="straightConnector1">
             <a:avLst/>
@@ -5547,56 +4395,13 @@
         </p:spPr>
         <p:style>
           <a:lnRef idx="3">
-            <a:schemeClr val="accent2"/>
+            <a:schemeClr val="accent1"/>
           </a:lnRef>
           <a:fillRef idx="0">
-            <a:schemeClr val="accent2"/>
+            <a:schemeClr val="accent1"/>
           </a:fillRef>
           <a:effectRef idx="2">
-            <a:schemeClr val="accent2"/>
-          </a:effectRef>
-          <a:fontRef idx="minor">
-            <a:schemeClr val="tx1"/>
-          </a:fontRef>
-        </p:style>
-      </p:cxnSp>
-      <p:cxnSp>
-        <p:nvCxnSpPr>
-          <p:cNvPr id="319" name="직선 화살표 연결선 318">
-            <a:extLst>
-              <a:ext uri="{FF2B5EF4-FFF2-40B4-BE49-F238E27FC236}">
-                <a16:creationId xmlns:a16="http://schemas.microsoft.com/office/drawing/2014/main" id="{2DC1BFBB-660F-5FBE-C904-98BA829201FF}"/>
-              </a:ext>
-            </a:extLst>
-          </p:cNvPr>
-          <p:cNvCxnSpPr>
-            <a:cxnSpLocks/>
-            <a:stCxn id="303" idx="4"/>
-            <a:endCxn id="315" idx="1"/>
-          </p:cNvCxnSpPr>
-          <p:nvPr/>
-        </p:nvCxnSpPr>
-        <p:spPr>
-          <a:xfrm>
-            <a:off x="4637043" y="4700244"/>
-            <a:ext cx="352963" cy="394884"/>
-          </a:xfrm>
-          <a:prstGeom prst="straightConnector1">
-            <a:avLst/>
-          </a:prstGeom>
-          <a:ln>
-            <a:tailEnd type="triangle"/>
-          </a:ln>
-        </p:spPr>
-        <p:style>
-          <a:lnRef idx="3">
-            <a:schemeClr val="accent2"/>
-          </a:lnRef>
-          <a:fillRef idx="0">
-            <a:schemeClr val="accent2"/>
-          </a:fillRef>
-          <a:effectRef idx="2">
-            <a:schemeClr val="accent2"/>
+            <a:schemeClr val="accent1"/>
           </a:effectRef>
           <a:fontRef idx="minor">
             <a:schemeClr val="tx1"/>
@@ -5606,7 +4411,7 @@
     </p:spTree>
     <p:extLst>
       <p:ext uri="{BB962C8B-B14F-4D97-AF65-F5344CB8AC3E}">
-        <p14:creationId xmlns:p14="http://schemas.microsoft.com/office/powerpoint/2010/main" val="3713779322"/>
+        <p14:creationId xmlns:p14="http://schemas.microsoft.com/office/powerpoint/2010/main" val="3523101145"/>
       </p:ext>
     </p:extLst>
   </p:cSld>
@@ -5635,10 +4440,10 @@
       </p:grpSpPr>
       <p:sp>
         <p:nvSpPr>
-          <p:cNvPr id="257" name="직사각형 256">
-            <a:extLst>
-              <a:ext uri="{FF2B5EF4-FFF2-40B4-BE49-F238E27FC236}">
-                <a16:creationId xmlns:a16="http://schemas.microsoft.com/office/drawing/2014/main" id="{6D077D42-E2E1-C995-7E8A-371B9B684F66}"/>
+          <p:cNvPr id="7" name="직사각형 6">
+            <a:extLst>
+              <a:ext uri="{FF2B5EF4-FFF2-40B4-BE49-F238E27FC236}">
+                <a16:creationId xmlns:a16="http://schemas.microsoft.com/office/drawing/2014/main" id="{FE0F70A9-B948-5105-6F83-EF9C136BC26D}"/>
               </a:ext>
             </a:extLst>
           </p:cNvPr>
@@ -5647,8 +4452,8 @@
         </p:nvSpPr>
         <p:spPr>
           <a:xfrm>
-            <a:off x="1170607" y="1631731"/>
-            <a:ext cx="2186152" cy="1072055"/>
+            <a:off x="919652" y="2910052"/>
+            <a:ext cx="1828801" cy="677917"/>
           </a:xfrm>
           <a:prstGeom prst="rect">
             <a:avLst/>
@@ -5676,41 +4481,150 @@
           <a:p>
             <a:pPr algn="ctr"/>
             <a:r>
+              <a:rPr kumimoji="1" lang="en-US" altLang="ko-Kore-KR" dirty="0"/>
+              <a:t>LinkedList</a:t>
+            </a:r>
+            <a:endParaRPr kumimoji="1" lang="ko-Kore-KR" altLang="en-US" dirty="0"/>
+          </a:p>
+        </p:txBody>
+      </p:sp>
+      <p:sp>
+        <p:nvSpPr>
+          <p:cNvPr id="14" name="TextBox 13">
+            <a:extLst>
+              <a:ext uri="{FF2B5EF4-FFF2-40B4-BE49-F238E27FC236}">
+                <a16:creationId xmlns:a16="http://schemas.microsoft.com/office/drawing/2014/main" id="{12424D5B-79B7-CF39-074C-257708FF3616}"/>
+              </a:ext>
+            </a:extLst>
+          </p:cNvPr>
+          <p:cNvSpPr txBox="1"/>
+          <p:nvPr/>
+        </p:nvSpPr>
+        <p:spPr>
+          <a:xfrm>
+            <a:off x="9609083" y="2941638"/>
+            <a:ext cx="1742090" cy="646331"/>
+          </a:xfrm>
+          <a:prstGeom prst="rect">
+            <a:avLst/>
+          </a:prstGeom>
+        </p:spPr>
+        <p:style>
+          <a:lnRef idx="2">
+            <a:schemeClr val="accent1"/>
+          </a:lnRef>
+          <a:fillRef idx="1">
+            <a:schemeClr val="lt1"/>
+          </a:fillRef>
+          <a:effectRef idx="0">
+            <a:schemeClr val="accent1"/>
+          </a:effectRef>
+          <a:fontRef idx="minor">
+            <a:schemeClr val="dk1"/>
+          </a:fontRef>
+        </p:style>
+        <p:txBody>
+          <a:bodyPr wrap="square" rtlCol="0">
+            <a:spAutoFit/>
+          </a:bodyPr>
+          <a:lstStyle/>
+          <a:p>
+            <a:r>
+              <a:rPr kumimoji="1" lang="en-US" altLang="ko-Kore-KR" dirty="0"/>
+              <a:t>if(</a:t>
+            </a:r>
+            <a:r>
               <a:rPr kumimoji="1" lang="en-US" altLang="ko-Kore-KR" dirty="0" err="1"/>
-              <a:t>BoardDao</a:t>
+              <a:t>hasNext</a:t>
+            </a:r>
+            <a:r>
+              <a:rPr kumimoji="1" lang="en-US" altLang="ko-Kore-KR" dirty="0"/>
+              <a:t>())</a:t>
+            </a:r>
+          </a:p>
+          <a:p>
+            <a:r>
+              <a:rPr kumimoji="1" lang="en-US" altLang="ko-Kore-KR" dirty="0">
+                <a:sym typeface="Wingdings" pitchFamily="2" charset="2"/>
+              </a:rPr>
+              <a:t> next();</a:t>
+            </a:r>
+            <a:endParaRPr kumimoji="1" lang="ko-Kore-KR" altLang="en-US" dirty="0"/>
+          </a:p>
+        </p:txBody>
+      </p:sp>
+      <p:sp>
+        <p:nvSpPr>
+          <p:cNvPr id="18" name="TextBox 17">
+            <a:extLst>
+              <a:ext uri="{FF2B5EF4-FFF2-40B4-BE49-F238E27FC236}">
+                <a16:creationId xmlns:a16="http://schemas.microsoft.com/office/drawing/2014/main" id="{4F232CB8-A83C-2EFF-9850-CE4F847D5AAA}"/>
+              </a:ext>
+            </a:extLst>
+          </p:cNvPr>
+          <p:cNvSpPr txBox="1"/>
+          <p:nvPr/>
+        </p:nvSpPr>
+        <p:spPr>
+          <a:xfrm>
+            <a:off x="4742788" y="3064344"/>
+            <a:ext cx="2706419" cy="369332"/>
+          </a:xfrm>
+          <a:prstGeom prst="rect">
+            <a:avLst/>
+          </a:prstGeom>
+        </p:spPr>
+        <p:style>
+          <a:lnRef idx="2">
+            <a:schemeClr val="accent5">
+              <a:shade val="50000"/>
+            </a:schemeClr>
+          </a:lnRef>
+          <a:fillRef idx="1">
+            <a:schemeClr val="accent5"/>
+          </a:fillRef>
+          <a:effectRef idx="0">
+            <a:schemeClr val="accent5"/>
+          </a:effectRef>
+          <a:fontRef idx="minor">
+            <a:schemeClr val="lt1"/>
+          </a:fontRef>
+        </p:style>
+        <p:txBody>
+          <a:bodyPr wrap="square" rtlCol="0">
+            <a:spAutoFit/>
+          </a:bodyPr>
+          <a:lstStyle/>
+          <a:p>
+            <a:pPr algn="ctr"/>
+            <a:r>
+              <a:rPr kumimoji="1" lang="en-US" altLang="ko-Kore-KR" dirty="0" err="1"/>
+              <a:t>LinkedListIterator</a:t>
             </a:r>
             <a:endParaRPr kumimoji="1" lang="en-US" altLang="ko-Kore-KR" dirty="0"/>
-          </a:p>
-          <a:p>
-            <a:pPr algn="ctr"/>
-            <a:r>
-              <a:rPr kumimoji="1" lang="en-US" altLang="ko-Kore-KR" dirty="0"/>
-              <a:t>class</a:t>
-            </a:r>
-            <a:endParaRPr kumimoji="1" lang="ko-Kore-KR" altLang="en-US" dirty="0"/>
           </a:p>
         </p:txBody>
       </p:sp>
       <p:cxnSp>
         <p:nvCxnSpPr>
-          <p:cNvPr id="260" name="직선 화살표 연결선 259">
-            <a:extLst>
-              <a:ext uri="{FF2B5EF4-FFF2-40B4-BE49-F238E27FC236}">
-                <a16:creationId xmlns:a16="http://schemas.microsoft.com/office/drawing/2014/main" id="{44CDA04F-9E1D-E16E-53B5-3FF53A506A54}"/>
+          <p:cNvPr id="25" name="직선 화살표 연결선 24">
+            <a:extLst>
+              <a:ext uri="{FF2B5EF4-FFF2-40B4-BE49-F238E27FC236}">
+                <a16:creationId xmlns:a16="http://schemas.microsoft.com/office/drawing/2014/main" id="{62F1336D-E9AB-EBCF-BA83-7950534502BA}"/>
               </a:ext>
             </a:extLst>
           </p:cNvPr>
           <p:cNvCxnSpPr>
             <a:cxnSpLocks/>
-            <a:stCxn id="257" idx="3"/>
-            <a:endCxn id="263" idx="1"/>
+            <a:stCxn id="14" idx="1"/>
+            <a:endCxn id="18" idx="3"/>
           </p:cNvCxnSpPr>
           <p:nvPr/>
         </p:nvCxnSpPr>
         <p:spPr>
-          <a:xfrm flipV="1">
-            <a:off x="3356759" y="2167758"/>
-            <a:ext cx="2585545" cy="1"/>
+          <a:xfrm flipH="1" flipV="1">
+            <a:off x="7449207" y="3249010"/>
+            <a:ext cx="2159876" cy="15794"/>
           </a:xfrm>
           <a:prstGeom prst="straightConnector1">
             <a:avLst/>
@@ -5734,12 +4648,55 @@
           </a:fontRef>
         </p:style>
       </p:cxnSp>
-      <p:sp>
-        <p:nvSpPr>
-          <p:cNvPr id="263" name="직사각형 262">
-            <a:extLst>
-              <a:ext uri="{FF2B5EF4-FFF2-40B4-BE49-F238E27FC236}">
-                <a16:creationId xmlns:a16="http://schemas.microsoft.com/office/drawing/2014/main" id="{AD08EE50-6B41-7A91-5E6D-A190A24F3D85}"/>
+      <p:cxnSp>
+        <p:nvCxnSpPr>
+          <p:cNvPr id="42" name="직선 화살표 연결선 41">
+            <a:extLst>
+              <a:ext uri="{FF2B5EF4-FFF2-40B4-BE49-F238E27FC236}">
+                <a16:creationId xmlns:a16="http://schemas.microsoft.com/office/drawing/2014/main" id="{90F6D2E0-5401-948F-D33B-E53762B575D2}"/>
+              </a:ext>
+            </a:extLst>
+          </p:cNvPr>
+          <p:cNvCxnSpPr>
+            <a:cxnSpLocks/>
+            <a:stCxn id="7" idx="3"/>
+            <a:endCxn id="18" idx="1"/>
+          </p:cNvCxnSpPr>
+          <p:nvPr/>
+        </p:nvCxnSpPr>
+        <p:spPr>
+          <a:xfrm flipV="1">
+            <a:off x="2748453" y="3249010"/>
+            <a:ext cx="1994335" cy="1"/>
+          </a:xfrm>
+          <a:prstGeom prst="straightConnector1">
+            <a:avLst/>
+          </a:prstGeom>
+          <a:ln>
+            <a:tailEnd type="triangle"/>
+          </a:ln>
+        </p:spPr>
+        <p:style>
+          <a:lnRef idx="3">
+            <a:schemeClr val="accent1"/>
+          </a:lnRef>
+          <a:fillRef idx="0">
+            <a:schemeClr val="accent1"/>
+          </a:fillRef>
+          <a:effectRef idx="2">
+            <a:schemeClr val="accent1"/>
+          </a:effectRef>
+          <a:fontRef idx="minor">
+            <a:schemeClr val="tx1"/>
+          </a:fontRef>
+        </p:style>
+      </p:cxnSp>
+      <p:sp>
+        <p:nvSpPr>
+          <p:cNvPr id="3" name="직사각형 2">
+            <a:extLst>
+              <a:ext uri="{FF2B5EF4-FFF2-40B4-BE49-F238E27FC236}">
+                <a16:creationId xmlns:a16="http://schemas.microsoft.com/office/drawing/2014/main" id="{3E2CAA9F-9834-BA5B-C62A-384357B8EC6D}"/>
               </a:ext>
             </a:extLst>
           </p:cNvPr>
@@ -5748,10 +4705,159 @@
         </p:nvSpPr>
         <p:spPr>
           <a:xfrm>
-            <a:off x="5942304" y="1631730"/>
-            <a:ext cx="2186152" cy="1072055"/>
+            <a:off x="5181598" y="739666"/>
+            <a:ext cx="1828801" cy="677917"/>
           </a:xfrm>
           <a:prstGeom prst="rect">
+            <a:avLst/>
+          </a:prstGeom>
+        </p:spPr>
+        <p:style>
+          <a:lnRef idx="3">
+            <a:schemeClr val="lt1"/>
+          </a:lnRef>
+          <a:fillRef idx="1">
+            <a:schemeClr val="accent3"/>
+          </a:fillRef>
+          <a:effectRef idx="1">
+            <a:schemeClr val="accent3"/>
+          </a:effectRef>
+          <a:fontRef idx="minor">
+            <a:schemeClr val="lt1"/>
+          </a:fontRef>
+        </p:style>
+        <p:txBody>
+          <a:bodyPr rtlCol="0" anchor="ctr"/>
+          <a:lstStyle/>
+          <a:p>
+            <a:pPr algn="ctr"/>
+            <a:r>
+              <a:rPr kumimoji="1" lang="en-US" altLang="ko-Kore-KR" dirty="0"/>
+              <a:t>&lt;&lt;Interface&gt;&gt;</a:t>
+            </a:r>
+          </a:p>
+          <a:p>
+            <a:pPr algn="ctr"/>
+            <a:r>
+              <a:rPr kumimoji="1" lang="en-US" altLang="ko-Kore-KR" dirty="0"/>
+              <a:t>Iterator</a:t>
+            </a:r>
+            <a:endParaRPr kumimoji="1" lang="ko-Kore-KR" altLang="en-US" dirty="0"/>
+          </a:p>
+        </p:txBody>
+      </p:sp>
+      <p:cxnSp>
+        <p:nvCxnSpPr>
+          <p:cNvPr id="6" name="직선 화살표 연결선 5">
+            <a:extLst>
+              <a:ext uri="{FF2B5EF4-FFF2-40B4-BE49-F238E27FC236}">
+                <a16:creationId xmlns:a16="http://schemas.microsoft.com/office/drawing/2014/main" id="{7454DA08-36E3-92F7-40B8-0D489D533627}"/>
+              </a:ext>
+            </a:extLst>
+          </p:cNvPr>
+          <p:cNvCxnSpPr>
+            <a:stCxn id="18" idx="0"/>
+            <a:endCxn id="3" idx="2"/>
+          </p:cNvCxnSpPr>
+          <p:nvPr/>
+        </p:nvCxnSpPr>
+        <p:spPr>
+          <a:xfrm flipV="1">
+            <a:off x="6095998" y="1417583"/>
+            <a:ext cx="1" cy="1646761"/>
+          </a:xfrm>
+          <a:prstGeom prst="straightConnector1">
+            <a:avLst/>
+          </a:prstGeom>
+          <a:ln w="9525" cap="flat" cmpd="sng" algn="ctr">
+            <a:solidFill>
+              <a:schemeClr val="accent3"/>
+            </a:solidFill>
+            <a:prstDash val="dash"/>
+            <a:round/>
+            <a:headEnd type="none" w="med" len="med"/>
+            <a:tailEnd type="none" w="med" len="med"/>
+          </a:ln>
+        </p:spPr>
+        <p:style>
+          <a:lnRef idx="0">
+            <a:scrgbClr r="0" g="0" b="0"/>
+          </a:lnRef>
+          <a:fillRef idx="0">
+            <a:scrgbClr r="0" g="0" b="0"/>
+          </a:fillRef>
+          <a:effectRef idx="0">
+            <a:scrgbClr r="0" g="0" b="0"/>
+          </a:effectRef>
+          <a:fontRef idx="minor">
+            <a:schemeClr val="tx1"/>
+          </a:fontRef>
+        </p:style>
+      </p:cxnSp>
+      <p:sp>
+        <p:nvSpPr>
+          <p:cNvPr id="11" name="삼각형 10">
+            <a:extLst>
+              <a:ext uri="{FF2B5EF4-FFF2-40B4-BE49-F238E27FC236}">
+                <a16:creationId xmlns:a16="http://schemas.microsoft.com/office/drawing/2014/main" id="{36B2A171-E450-7BED-24BD-794E2A27D2D9}"/>
+              </a:ext>
+            </a:extLst>
+          </p:cNvPr>
+          <p:cNvSpPr/>
+          <p:nvPr/>
+        </p:nvSpPr>
+        <p:spPr>
+          <a:xfrm>
+            <a:off x="5975129" y="1417583"/>
+            <a:ext cx="241738" cy="208395"/>
+          </a:xfrm>
+          <a:prstGeom prst="triangle">
+            <a:avLst/>
+          </a:prstGeom>
+        </p:spPr>
+        <p:style>
+          <a:lnRef idx="2">
+            <a:schemeClr val="accent3">
+              <a:shade val="50000"/>
+            </a:schemeClr>
+          </a:lnRef>
+          <a:fillRef idx="1">
+            <a:schemeClr val="accent3"/>
+          </a:fillRef>
+          <a:effectRef idx="0">
+            <a:schemeClr val="accent3"/>
+          </a:effectRef>
+          <a:fontRef idx="minor">
+            <a:schemeClr val="lt1"/>
+          </a:fontRef>
+        </p:style>
+        <p:txBody>
+          <a:bodyPr rtlCol="0" anchor="ctr"/>
+          <a:lstStyle/>
+          <a:p>
+            <a:pPr algn="ctr"/>
+            <a:endParaRPr kumimoji="1" lang="ko-Kore-KR" altLang="en-US"/>
+          </a:p>
+        </p:txBody>
+      </p:sp>
+      <p:sp>
+        <p:nvSpPr>
+          <p:cNvPr id="16" name="다이아몬드 15">
+            <a:extLst>
+              <a:ext uri="{FF2B5EF4-FFF2-40B4-BE49-F238E27FC236}">
+                <a16:creationId xmlns:a16="http://schemas.microsoft.com/office/drawing/2014/main" id="{B8B44190-F3F6-3E76-77B6-58EEFEEDC8D2}"/>
+              </a:ext>
+            </a:extLst>
+          </p:cNvPr>
+          <p:cNvSpPr/>
+          <p:nvPr/>
+        </p:nvSpPr>
+        <p:spPr>
+          <a:xfrm>
+            <a:off x="2748453" y="3064344"/>
+            <a:ext cx="364656" cy="364656"/>
+          </a:xfrm>
+          <a:prstGeom prst="diamond">
             <a:avLst/>
           </a:prstGeom>
         </p:spPr>
@@ -5776,302 +4882,14 @@
           <a:lstStyle/>
           <a:p>
             <a:pPr algn="ctr"/>
-            <a:r>
-              <a:rPr kumimoji="1" lang="en-US" altLang="ko-Kore-KR" dirty="0"/>
-              <a:t>LinkedList</a:t>
-            </a:r>
-            <a:endParaRPr kumimoji="1" lang="ko-Kore-KR" altLang="en-US" dirty="0"/>
-          </a:p>
-        </p:txBody>
-      </p:sp>
-      <p:sp>
-        <p:nvSpPr>
-          <p:cNvPr id="5" name="직사각형 4">
-            <a:extLst>
-              <a:ext uri="{FF2B5EF4-FFF2-40B4-BE49-F238E27FC236}">
-                <a16:creationId xmlns:a16="http://schemas.microsoft.com/office/drawing/2014/main" id="{4B736A98-8EA5-6608-C066-34BE4384BA15}"/>
-              </a:ext>
-            </a:extLst>
-          </p:cNvPr>
-          <p:cNvSpPr/>
-          <p:nvPr/>
-        </p:nvSpPr>
-        <p:spPr>
-          <a:xfrm>
-            <a:off x="5507421" y="3239812"/>
-            <a:ext cx="3415862" cy="1072055"/>
-          </a:xfrm>
-          <a:prstGeom prst="rect">
-            <a:avLst/>
-          </a:prstGeom>
-        </p:spPr>
-        <p:style>
-          <a:lnRef idx="2">
-            <a:schemeClr val="accent2">
-              <a:shade val="50000"/>
-            </a:schemeClr>
-          </a:lnRef>
-          <a:fillRef idx="1">
-            <a:schemeClr val="accent2"/>
-          </a:fillRef>
-          <a:effectRef idx="0">
-            <a:schemeClr val="accent2"/>
-          </a:effectRef>
-          <a:fontRef idx="minor">
-            <a:schemeClr val="lt1"/>
-          </a:fontRef>
-        </p:style>
-        <p:txBody>
-          <a:bodyPr rtlCol="0" anchor="ctr"/>
-          <a:lstStyle/>
-          <a:p>
-            <a:pPr algn="ctr"/>
-            <a:r>
-              <a:rPr kumimoji="1" lang="en-US" altLang="ko-Kore-KR" dirty="0"/>
-              <a:t>LinkedList</a:t>
-            </a:r>
-            <a:r>
-              <a:rPr kumimoji="1" lang="ko-KR" altLang="en-US" dirty="0"/>
-              <a:t> </a:t>
-            </a:r>
-            <a:r>
-              <a:rPr kumimoji="1" lang="en-US" altLang="ko-KR" dirty="0"/>
-              <a:t>&lt;Board&gt;</a:t>
-            </a:r>
-            <a:endParaRPr kumimoji="1" lang="ko-Kore-KR" altLang="en-US" dirty="0"/>
-          </a:p>
-        </p:txBody>
-      </p:sp>
-      <p:cxnSp>
-        <p:nvCxnSpPr>
-          <p:cNvPr id="6" name="직선 화살표 연결선 5">
-            <a:extLst>
-              <a:ext uri="{FF2B5EF4-FFF2-40B4-BE49-F238E27FC236}">
-                <a16:creationId xmlns:a16="http://schemas.microsoft.com/office/drawing/2014/main" id="{AF16B19E-2FB8-92A5-2F0D-CE48CE4BF90C}"/>
-              </a:ext>
-            </a:extLst>
-          </p:cNvPr>
-          <p:cNvCxnSpPr>
-            <a:cxnSpLocks/>
-            <a:stCxn id="257" idx="3"/>
-            <a:endCxn id="5" idx="1"/>
-          </p:cNvCxnSpPr>
-          <p:nvPr/>
-        </p:nvCxnSpPr>
-        <p:spPr>
-          <a:xfrm>
-            <a:off x="3356759" y="2167759"/>
-            <a:ext cx="2150662" cy="1608081"/>
-          </a:xfrm>
-          <a:prstGeom prst="straightConnector1">
-            <a:avLst/>
-          </a:prstGeom>
-          <a:ln>
-            <a:solidFill>
-              <a:schemeClr val="accent2"/>
-            </a:solidFill>
-            <a:tailEnd type="triangle"/>
-          </a:ln>
-        </p:spPr>
-        <p:style>
-          <a:lnRef idx="3">
-            <a:schemeClr val="accent1"/>
-          </a:lnRef>
-          <a:fillRef idx="0">
-            <a:schemeClr val="accent1"/>
-          </a:fillRef>
-          <a:effectRef idx="2">
-            <a:schemeClr val="accent1"/>
-          </a:effectRef>
-          <a:fontRef idx="minor">
-            <a:schemeClr val="tx1"/>
-          </a:fontRef>
-        </p:style>
-      </p:cxnSp>
-      <p:sp>
-        <p:nvSpPr>
-          <p:cNvPr id="11" name="왼쪽으로 구부러진 화살표[C] 10">
-            <a:extLst>
-              <a:ext uri="{FF2B5EF4-FFF2-40B4-BE49-F238E27FC236}">
-                <a16:creationId xmlns:a16="http://schemas.microsoft.com/office/drawing/2014/main" id="{85302F02-B925-7E6E-D327-A5F855295EF7}"/>
-              </a:ext>
-            </a:extLst>
-          </p:cNvPr>
-          <p:cNvSpPr/>
-          <p:nvPr/>
-        </p:nvSpPr>
-        <p:spPr>
-          <a:xfrm rot="5400000">
-            <a:off x="7115503" y="3762703"/>
-            <a:ext cx="525517" cy="861849"/>
-          </a:xfrm>
-          <a:prstGeom prst="curvedLeftArrow">
-            <a:avLst>
-              <a:gd name="adj1" fmla="val 25000"/>
-              <a:gd name="adj2" fmla="val 47284"/>
-              <a:gd name="adj3" fmla="val 25000"/>
-            </a:avLst>
-          </a:prstGeom>
-        </p:spPr>
-        <p:style>
-          <a:lnRef idx="2">
-            <a:schemeClr val="accent4">
-              <a:shade val="50000"/>
-            </a:schemeClr>
-          </a:lnRef>
-          <a:fillRef idx="1">
-            <a:schemeClr val="accent4"/>
-          </a:fillRef>
-          <a:effectRef idx="0">
-            <a:schemeClr val="accent4"/>
-          </a:effectRef>
-          <a:fontRef idx="minor">
-            <a:schemeClr val="lt1"/>
-          </a:fontRef>
-        </p:style>
-        <p:txBody>
-          <a:bodyPr rtlCol="0" anchor="ctr"/>
-          <a:lstStyle/>
-          <a:p>
-            <a:pPr algn="ctr"/>
-            <a:endParaRPr kumimoji="1" lang="ko-Kore-KR" altLang="en-US">
-              <a:solidFill>
-                <a:schemeClr val="tx1"/>
-              </a:solidFill>
-            </a:endParaRPr>
-          </a:p>
-        </p:txBody>
-      </p:sp>
-      <p:sp>
-        <p:nvSpPr>
-          <p:cNvPr id="12" name="TextBox 11">
-            <a:extLst>
-              <a:ext uri="{FF2B5EF4-FFF2-40B4-BE49-F238E27FC236}">
-                <a16:creationId xmlns:a16="http://schemas.microsoft.com/office/drawing/2014/main" id="{F57E57DE-10C7-EE86-C799-0BDD82A476EE}"/>
-              </a:ext>
-            </a:extLst>
-          </p:cNvPr>
-          <p:cNvSpPr txBox="1"/>
-          <p:nvPr/>
-        </p:nvSpPr>
-        <p:spPr>
-          <a:xfrm>
-            <a:off x="5507421" y="4679758"/>
-            <a:ext cx="4046484" cy="646331"/>
-          </a:xfrm>
-          <a:prstGeom prst="rect">
-            <a:avLst/>
-          </a:prstGeom>
-        </p:spPr>
-        <p:style>
-          <a:lnRef idx="2">
-            <a:schemeClr val="accent4"/>
-          </a:lnRef>
-          <a:fillRef idx="1">
-            <a:schemeClr val="lt1"/>
-          </a:fillRef>
-          <a:effectRef idx="0">
-            <a:schemeClr val="accent4"/>
-          </a:effectRef>
-          <a:fontRef idx="minor">
-            <a:schemeClr val="dk1"/>
-          </a:fontRef>
-        </p:style>
-        <p:txBody>
-          <a:bodyPr wrap="square" rtlCol="0">
-            <a:spAutoFit/>
-          </a:bodyPr>
-          <a:lstStyle/>
-          <a:p>
-            <a:r>
-              <a:rPr kumimoji="1" lang="en-US" altLang="ko-Kore-KR" dirty="0"/>
-              <a:t>LinkedList </a:t>
-            </a:r>
-            <a:r>
-              <a:rPr kumimoji="1" lang="ko-Kore-KR" altLang="en-US" dirty="0"/>
-              <a:t>클래스가</a:t>
-            </a:r>
-            <a:r>
-              <a:rPr kumimoji="1" lang="ko-KR" altLang="en-US" dirty="0"/>
-              <a:t> 다뤄야할</a:t>
-            </a:r>
-            <a:endParaRPr kumimoji="1" lang="en-US" altLang="ko-KR" dirty="0"/>
-          </a:p>
-          <a:p>
-            <a:r>
-              <a:rPr kumimoji="1" lang="ko-KR" altLang="en-US" dirty="0"/>
-              <a:t>항목의 타입을 파라미터로 전달한다</a:t>
-            </a:r>
-            <a:r>
-              <a:rPr kumimoji="1" lang="en-US" altLang="ko-KR" dirty="0"/>
-              <a:t>.</a:t>
-            </a:r>
-            <a:endParaRPr kumimoji="1" lang="ko-Kore-KR" altLang="en-US" dirty="0"/>
-          </a:p>
-        </p:txBody>
-      </p:sp>
-      <p:sp>
-        <p:nvSpPr>
-          <p:cNvPr id="13" name="곱하기 12">
-            <a:extLst>
-              <a:ext uri="{FF2B5EF4-FFF2-40B4-BE49-F238E27FC236}">
-                <a16:creationId xmlns:a16="http://schemas.microsoft.com/office/drawing/2014/main" id="{F88D150E-0F31-115C-67EC-8D7AFB57935A}"/>
-              </a:ext>
-            </a:extLst>
-          </p:cNvPr>
-          <p:cNvSpPr/>
-          <p:nvPr/>
-        </p:nvSpPr>
-        <p:spPr>
-          <a:xfrm>
-            <a:off x="2427889" y="1337411"/>
-            <a:ext cx="9038896" cy="1534510"/>
-          </a:xfrm>
-          <a:prstGeom prst="mathMultiply">
-            <a:avLst/>
-          </a:prstGeom>
-          <a:solidFill>
-            <a:srgbClr val="FDA9F7">
-              <a:alpha val="68000"/>
-            </a:srgbClr>
-          </a:solidFill>
-          <a:ln>
-            <a:solidFill>
-              <a:schemeClr val="accent1">
-                <a:shade val="50000"/>
-              </a:schemeClr>
-            </a:solidFill>
-          </a:ln>
-        </p:spPr>
-        <p:style>
-          <a:lnRef idx="2">
-            <a:schemeClr val="accent1">
-              <a:shade val="50000"/>
-            </a:schemeClr>
-          </a:lnRef>
-          <a:fillRef idx="1">
-            <a:schemeClr val="accent1"/>
-          </a:fillRef>
-          <a:effectRef idx="0">
-            <a:schemeClr val="accent1"/>
-          </a:effectRef>
-          <a:fontRef idx="minor">
-            <a:schemeClr val="lt1"/>
-          </a:fontRef>
-        </p:style>
-        <p:txBody>
-          <a:bodyPr rtlCol="0" anchor="ctr"/>
-          <a:lstStyle/>
-          <a:p>
-            <a:pPr algn="ctr"/>
-            <a:endParaRPr kumimoji="1" lang="ko-Kore-KR" altLang="en-US" dirty="0"/>
+            <a:endParaRPr kumimoji="1" lang="ko-Kore-KR" altLang="en-US"/>
           </a:p>
         </p:txBody>
       </p:sp>
     </p:spTree>
     <p:extLst>
       <p:ext uri="{BB962C8B-B14F-4D97-AF65-F5344CB8AC3E}">
-        <p14:creationId xmlns:p14="http://schemas.microsoft.com/office/powerpoint/2010/main" val="3523101145"/>
+        <p14:creationId xmlns:p14="http://schemas.microsoft.com/office/powerpoint/2010/main" val="2583825536"/>
       </p:ext>
     </p:extLst>
   </p:cSld>
@@ -6100,10 +4918,10 @@
       </p:grpSpPr>
       <p:sp>
         <p:nvSpPr>
-          <p:cNvPr id="257" name="직사각형 256">
-            <a:extLst>
-              <a:ext uri="{FF2B5EF4-FFF2-40B4-BE49-F238E27FC236}">
-                <a16:creationId xmlns:a16="http://schemas.microsoft.com/office/drawing/2014/main" id="{6D077D42-E2E1-C995-7E8A-371B9B684F66}"/>
+          <p:cNvPr id="7" name="직사각형 6">
+            <a:extLst>
+              <a:ext uri="{FF2B5EF4-FFF2-40B4-BE49-F238E27FC236}">
+                <a16:creationId xmlns:a16="http://schemas.microsoft.com/office/drawing/2014/main" id="{FE0F70A9-B948-5105-6F83-EF9C136BC26D}"/>
               </a:ext>
             </a:extLst>
           </p:cNvPr>
@@ -6112,8 +4930,8 @@
         </p:nvSpPr>
         <p:spPr>
           <a:xfrm>
-            <a:off x="1170607" y="1631731"/>
-            <a:ext cx="2186152" cy="1072055"/>
+            <a:off x="5514562" y="2857500"/>
+            <a:ext cx="1828801" cy="677917"/>
           </a:xfrm>
           <a:prstGeom prst="rect">
             <a:avLst/>
@@ -6142,7 +4960,7 @@
             <a:pPr algn="ctr"/>
             <a:r>
               <a:rPr kumimoji="1" lang="en-US" altLang="ko-Kore-KR" dirty="0" err="1"/>
-              <a:t>BoardDao</a:t>
+              <a:t>ArrayList</a:t>
             </a:r>
             <a:endParaRPr kumimoji="1" lang="en-US" altLang="ko-Kore-KR" dirty="0"/>
           </a:p>
@@ -6156,26 +4974,85 @@
           </a:p>
         </p:txBody>
       </p:sp>
+      <p:sp>
+        <p:nvSpPr>
+          <p:cNvPr id="18" name="TextBox 17">
+            <a:extLst>
+              <a:ext uri="{FF2B5EF4-FFF2-40B4-BE49-F238E27FC236}">
+                <a16:creationId xmlns:a16="http://schemas.microsoft.com/office/drawing/2014/main" id="{4F232CB8-A83C-2EFF-9850-CE4F847D5AAA}"/>
+              </a:ext>
+            </a:extLst>
+          </p:cNvPr>
+          <p:cNvSpPr txBox="1"/>
+          <p:nvPr/>
+        </p:nvSpPr>
+        <p:spPr>
+          <a:xfrm>
+            <a:off x="8719807" y="2857500"/>
+            <a:ext cx="2706419" cy="646331"/>
+          </a:xfrm>
+          <a:prstGeom prst="rect">
+            <a:avLst/>
+          </a:prstGeom>
+        </p:spPr>
+        <p:style>
+          <a:lnRef idx="2">
+            <a:schemeClr val="accent5">
+              <a:shade val="50000"/>
+            </a:schemeClr>
+          </a:lnRef>
+          <a:fillRef idx="1">
+            <a:schemeClr val="accent5"/>
+          </a:fillRef>
+          <a:effectRef idx="0">
+            <a:schemeClr val="accent5"/>
+          </a:effectRef>
+          <a:fontRef idx="minor">
+            <a:schemeClr val="lt1"/>
+          </a:fontRef>
+        </p:style>
+        <p:txBody>
+          <a:bodyPr wrap="square" rtlCol="0">
+            <a:spAutoFit/>
+          </a:bodyPr>
+          <a:lstStyle/>
+          <a:p>
+            <a:pPr algn="ctr"/>
+            <a:r>
+              <a:rPr kumimoji="1" lang="en-US" altLang="ko-Kore-KR" dirty="0" err="1"/>
+              <a:t>ArrayListIterator</a:t>
+            </a:r>
+            <a:endParaRPr kumimoji="1" lang="en-US" altLang="ko-Kore-KR" dirty="0"/>
+          </a:p>
+          <a:p>
+            <a:pPr algn="ctr"/>
+            <a:r>
+              <a:rPr kumimoji="1" lang="en-US" altLang="ko-Kore-KR" dirty="0"/>
+              <a:t>class</a:t>
+            </a:r>
+          </a:p>
+        </p:txBody>
+      </p:sp>
       <p:cxnSp>
         <p:nvCxnSpPr>
-          <p:cNvPr id="260" name="직선 화살표 연결선 259">
-            <a:extLst>
-              <a:ext uri="{FF2B5EF4-FFF2-40B4-BE49-F238E27FC236}">
-                <a16:creationId xmlns:a16="http://schemas.microsoft.com/office/drawing/2014/main" id="{44CDA04F-9E1D-E16E-53B5-3FF53A506A54}"/>
+          <p:cNvPr id="42" name="직선 화살표 연결선 41">
+            <a:extLst>
+              <a:ext uri="{FF2B5EF4-FFF2-40B4-BE49-F238E27FC236}">
+                <a16:creationId xmlns:a16="http://schemas.microsoft.com/office/drawing/2014/main" id="{90F6D2E0-5401-948F-D33B-E53762B575D2}"/>
               </a:ext>
             </a:extLst>
           </p:cNvPr>
           <p:cNvCxnSpPr>
             <a:cxnSpLocks/>
-            <a:stCxn id="257" idx="3"/>
-            <a:endCxn id="263" idx="1"/>
+            <a:stCxn id="7" idx="3"/>
+            <a:endCxn id="18" idx="1"/>
           </p:cNvCxnSpPr>
           <p:nvPr/>
         </p:nvCxnSpPr>
         <p:spPr>
           <a:xfrm flipV="1">
-            <a:off x="3356759" y="2167758"/>
-            <a:ext cx="2585545" cy="1"/>
+            <a:off x="7343363" y="3180666"/>
+            <a:ext cx="1376444" cy="15793"/>
           </a:xfrm>
           <a:prstGeom prst="straightConnector1">
             <a:avLst/>
@@ -6201,10 +5078,10 @@
       </p:cxnSp>
       <p:sp>
         <p:nvSpPr>
-          <p:cNvPr id="263" name="직사각형 262">
-            <a:extLst>
-              <a:ext uri="{FF2B5EF4-FFF2-40B4-BE49-F238E27FC236}">
-                <a16:creationId xmlns:a16="http://schemas.microsoft.com/office/drawing/2014/main" id="{AD08EE50-6B41-7A91-5E6D-A190A24F3D85}"/>
+          <p:cNvPr id="3" name="직사각형 2">
+            <a:extLst>
+              <a:ext uri="{FF2B5EF4-FFF2-40B4-BE49-F238E27FC236}">
+                <a16:creationId xmlns:a16="http://schemas.microsoft.com/office/drawing/2014/main" id="{3E2CAA9F-9834-BA5B-C62A-384357B8EC6D}"/>
               </a:ext>
             </a:extLst>
           </p:cNvPr>
@@ -6213,10 +5090,159 @@
         </p:nvSpPr>
         <p:spPr>
           <a:xfrm>
-            <a:off x="5942304" y="1631730"/>
-            <a:ext cx="2186152" cy="1072055"/>
+            <a:off x="9143997" y="687115"/>
+            <a:ext cx="1828801" cy="677917"/>
           </a:xfrm>
           <a:prstGeom prst="rect">
+            <a:avLst/>
+          </a:prstGeom>
+        </p:spPr>
+        <p:style>
+          <a:lnRef idx="3">
+            <a:schemeClr val="lt1"/>
+          </a:lnRef>
+          <a:fillRef idx="1">
+            <a:schemeClr val="accent3"/>
+          </a:fillRef>
+          <a:effectRef idx="1">
+            <a:schemeClr val="accent3"/>
+          </a:effectRef>
+          <a:fontRef idx="minor">
+            <a:schemeClr val="lt1"/>
+          </a:fontRef>
+        </p:style>
+        <p:txBody>
+          <a:bodyPr rtlCol="0" anchor="ctr"/>
+          <a:lstStyle/>
+          <a:p>
+            <a:pPr algn="ctr"/>
+            <a:r>
+              <a:rPr kumimoji="1" lang="en-US" altLang="ko-Kore-KR" dirty="0"/>
+              <a:t>&lt;&lt;Interface&gt;&gt;</a:t>
+            </a:r>
+          </a:p>
+          <a:p>
+            <a:pPr algn="ctr"/>
+            <a:r>
+              <a:rPr kumimoji="1" lang="en-US" altLang="ko-Kore-KR" dirty="0"/>
+              <a:t>Iterator</a:t>
+            </a:r>
+            <a:endParaRPr kumimoji="1" lang="ko-Kore-KR" altLang="en-US" dirty="0"/>
+          </a:p>
+        </p:txBody>
+      </p:sp>
+      <p:cxnSp>
+        <p:nvCxnSpPr>
+          <p:cNvPr id="6" name="직선 화살표 연결선 5">
+            <a:extLst>
+              <a:ext uri="{FF2B5EF4-FFF2-40B4-BE49-F238E27FC236}">
+                <a16:creationId xmlns:a16="http://schemas.microsoft.com/office/drawing/2014/main" id="{7454DA08-36E3-92F7-40B8-0D489D533627}"/>
+              </a:ext>
+            </a:extLst>
+          </p:cNvPr>
+          <p:cNvCxnSpPr>
+            <a:stCxn id="18" idx="0"/>
+            <a:endCxn id="3" idx="2"/>
+          </p:cNvCxnSpPr>
+          <p:nvPr/>
+        </p:nvCxnSpPr>
+        <p:spPr>
+          <a:xfrm flipH="1" flipV="1">
+            <a:off x="10058398" y="1365032"/>
+            <a:ext cx="14619" cy="1492468"/>
+          </a:xfrm>
+          <a:prstGeom prst="straightConnector1">
+            <a:avLst/>
+          </a:prstGeom>
+          <a:ln w="9525" cap="flat" cmpd="sng" algn="ctr">
+            <a:solidFill>
+              <a:schemeClr val="accent3"/>
+            </a:solidFill>
+            <a:prstDash val="dash"/>
+            <a:round/>
+            <a:headEnd type="none" w="med" len="med"/>
+            <a:tailEnd type="none" w="med" len="med"/>
+          </a:ln>
+        </p:spPr>
+        <p:style>
+          <a:lnRef idx="0">
+            <a:scrgbClr r="0" g="0" b="0"/>
+          </a:lnRef>
+          <a:fillRef idx="0">
+            <a:scrgbClr r="0" g="0" b="0"/>
+          </a:fillRef>
+          <a:effectRef idx="0">
+            <a:scrgbClr r="0" g="0" b="0"/>
+          </a:effectRef>
+          <a:fontRef idx="minor">
+            <a:schemeClr val="tx1"/>
+          </a:fontRef>
+        </p:style>
+      </p:cxnSp>
+      <p:sp>
+        <p:nvSpPr>
+          <p:cNvPr id="11" name="삼각형 10">
+            <a:extLst>
+              <a:ext uri="{FF2B5EF4-FFF2-40B4-BE49-F238E27FC236}">
+                <a16:creationId xmlns:a16="http://schemas.microsoft.com/office/drawing/2014/main" id="{36B2A171-E450-7BED-24BD-794E2A27D2D9}"/>
+              </a:ext>
+            </a:extLst>
+          </p:cNvPr>
+          <p:cNvSpPr/>
+          <p:nvPr/>
+        </p:nvSpPr>
+        <p:spPr>
+          <a:xfrm>
+            <a:off x="9937528" y="1365032"/>
+            <a:ext cx="241738" cy="208395"/>
+          </a:xfrm>
+          <a:prstGeom prst="triangle">
+            <a:avLst/>
+          </a:prstGeom>
+        </p:spPr>
+        <p:style>
+          <a:lnRef idx="2">
+            <a:schemeClr val="accent3">
+              <a:shade val="50000"/>
+            </a:schemeClr>
+          </a:lnRef>
+          <a:fillRef idx="1">
+            <a:schemeClr val="accent3"/>
+          </a:fillRef>
+          <a:effectRef idx="0">
+            <a:schemeClr val="accent3"/>
+          </a:effectRef>
+          <a:fontRef idx="minor">
+            <a:schemeClr val="lt1"/>
+          </a:fontRef>
+        </p:style>
+        <p:txBody>
+          <a:bodyPr rtlCol="0" anchor="ctr"/>
+          <a:lstStyle/>
+          <a:p>
+            <a:pPr algn="ctr"/>
+            <a:endParaRPr kumimoji="1" lang="ko-Kore-KR" altLang="en-US"/>
+          </a:p>
+        </p:txBody>
+      </p:sp>
+      <p:sp>
+        <p:nvSpPr>
+          <p:cNvPr id="16" name="다이아몬드 15">
+            <a:extLst>
+              <a:ext uri="{FF2B5EF4-FFF2-40B4-BE49-F238E27FC236}">
+                <a16:creationId xmlns:a16="http://schemas.microsoft.com/office/drawing/2014/main" id="{B8B44190-F3F6-3E76-77B6-58EEFEEDC8D2}"/>
+              </a:ext>
+            </a:extLst>
+          </p:cNvPr>
+          <p:cNvSpPr/>
+          <p:nvPr/>
+        </p:nvSpPr>
+        <p:spPr>
+          <a:xfrm>
+            <a:off x="7343363" y="3022028"/>
+            <a:ext cx="364656" cy="364656"/>
+          </a:xfrm>
+          <a:prstGeom prst="diamond">
             <a:avLst/>
           </a:prstGeom>
         </p:spPr>
@@ -6241,20 +5267,16 @@
           <a:lstStyle/>
           <a:p>
             <a:pPr algn="ctr"/>
-            <a:r>
-              <a:rPr kumimoji="1" lang="en-US" altLang="ko-Kore-KR" dirty="0"/>
-              <a:t>LinkedList</a:t>
-            </a:r>
-            <a:endParaRPr kumimoji="1" lang="ko-Kore-KR" altLang="en-US" dirty="0"/>
-          </a:p>
-        </p:txBody>
-      </p:sp>
-      <p:sp>
-        <p:nvSpPr>
-          <p:cNvPr id="5" name="직사각형 4">
-            <a:extLst>
-              <a:ext uri="{FF2B5EF4-FFF2-40B4-BE49-F238E27FC236}">
-                <a16:creationId xmlns:a16="http://schemas.microsoft.com/office/drawing/2014/main" id="{4B736A98-8EA5-6608-C066-34BE4384BA15}"/>
+            <a:endParaRPr kumimoji="1" lang="ko-Kore-KR" altLang="en-US"/>
+          </a:p>
+        </p:txBody>
+      </p:sp>
+      <p:sp>
+        <p:nvSpPr>
+          <p:cNvPr id="9" name="웃는 얼굴[S] 8">
+            <a:extLst>
+              <a:ext uri="{FF2B5EF4-FFF2-40B4-BE49-F238E27FC236}">
+                <a16:creationId xmlns:a16="http://schemas.microsoft.com/office/drawing/2014/main" id="{9AD281F6-8FBE-AF90-8550-860B19166E98}"/>
               </a:ext>
             </a:extLst>
           </p:cNvPr>
@@ -6263,8 +5285,52 @@
         </p:nvSpPr>
         <p:spPr>
           <a:xfrm>
-            <a:off x="5507421" y="3239812"/>
-            <a:ext cx="3415862" cy="1072055"/>
+            <a:off x="819809" y="2461681"/>
+            <a:ext cx="1313793" cy="1313793"/>
+          </a:xfrm>
+          <a:prstGeom prst="smileyFace">
+            <a:avLst/>
+          </a:prstGeom>
+        </p:spPr>
+        <p:style>
+          <a:lnRef idx="3">
+            <a:schemeClr val="lt1"/>
+          </a:lnRef>
+          <a:fillRef idx="1">
+            <a:schemeClr val="accent4"/>
+          </a:fillRef>
+          <a:effectRef idx="1">
+            <a:schemeClr val="accent4"/>
+          </a:effectRef>
+          <a:fontRef idx="minor">
+            <a:schemeClr val="lt1"/>
+          </a:fontRef>
+        </p:style>
+        <p:txBody>
+          <a:bodyPr rtlCol="0" anchor="ctr"/>
+          <a:lstStyle/>
+          <a:p>
+            <a:pPr algn="ctr"/>
+            <a:endParaRPr kumimoji="1" lang="ko-Kore-KR" altLang="en-US"/>
+          </a:p>
+        </p:txBody>
+      </p:sp>
+      <p:sp>
+        <p:nvSpPr>
+          <p:cNvPr id="10" name="TextBox 9">
+            <a:extLst>
+              <a:ext uri="{FF2B5EF4-FFF2-40B4-BE49-F238E27FC236}">
+                <a16:creationId xmlns:a16="http://schemas.microsoft.com/office/drawing/2014/main" id="{F059417A-1666-A201-A3EB-C2369ABB6376}"/>
+              </a:ext>
+            </a:extLst>
+          </p:cNvPr>
+          <p:cNvSpPr txBox="1"/>
+          <p:nvPr/>
+        </p:nvSpPr>
+        <p:spPr>
+          <a:xfrm>
+            <a:off x="945932" y="2024905"/>
+            <a:ext cx="1061545" cy="369332"/>
           </a:xfrm>
           <a:prstGeom prst="rect">
             <a:avLst/>
@@ -6272,36 +5338,379 @@
         </p:spPr>
         <p:style>
           <a:lnRef idx="2">
-            <a:schemeClr val="accent2">
-              <a:shade val="50000"/>
-            </a:schemeClr>
+            <a:schemeClr val="accent4"/>
           </a:lnRef>
           <a:fillRef idx="1">
+            <a:schemeClr val="lt1"/>
+          </a:fillRef>
+          <a:effectRef idx="0">
+            <a:schemeClr val="accent4"/>
+          </a:effectRef>
+          <a:fontRef idx="minor">
+            <a:schemeClr val="dk1"/>
+          </a:fontRef>
+        </p:style>
+        <p:txBody>
+          <a:bodyPr wrap="square" rtlCol="0">
+            <a:spAutoFit/>
+          </a:bodyPr>
+          <a:lstStyle/>
+          <a:p>
+            <a:r>
+              <a:rPr kumimoji="1" lang="en-US" altLang="ko-Kore-KR" dirty="0"/>
+              <a:t>Test01</a:t>
+            </a:r>
+            <a:endParaRPr kumimoji="1" lang="ko-Kore-KR" altLang="en-US" dirty="0"/>
+          </a:p>
+        </p:txBody>
+      </p:sp>
+      <p:cxnSp>
+        <p:nvCxnSpPr>
+          <p:cNvPr id="13" name="직선 화살표 연결선 12">
+            <a:extLst>
+              <a:ext uri="{FF2B5EF4-FFF2-40B4-BE49-F238E27FC236}">
+                <a16:creationId xmlns:a16="http://schemas.microsoft.com/office/drawing/2014/main" id="{802D944C-A824-0AC2-724D-C6C5E9004EF8}"/>
+              </a:ext>
+            </a:extLst>
+          </p:cNvPr>
+          <p:cNvCxnSpPr>
+            <a:cxnSpLocks/>
+            <a:stCxn id="9" idx="7"/>
+            <a:endCxn id="7" idx="0"/>
+          </p:cNvCxnSpPr>
+          <p:nvPr/>
+        </p:nvCxnSpPr>
+        <p:spPr>
+          <a:xfrm>
+            <a:off x="1941201" y="2654082"/>
+            <a:ext cx="4487762" cy="203418"/>
+          </a:xfrm>
+          <a:prstGeom prst="straightConnector1">
+            <a:avLst/>
+          </a:prstGeom>
+          <a:ln>
+            <a:tailEnd type="triangle"/>
+          </a:ln>
+        </p:spPr>
+        <p:style>
+          <a:lnRef idx="3">
+            <a:schemeClr val="accent4"/>
+          </a:lnRef>
+          <a:fillRef idx="0">
+            <a:schemeClr val="accent4"/>
+          </a:fillRef>
+          <a:effectRef idx="2">
+            <a:schemeClr val="accent4"/>
+          </a:effectRef>
+          <a:fontRef idx="minor">
+            <a:schemeClr val="tx1"/>
+          </a:fontRef>
+        </p:style>
+      </p:cxnSp>
+      <p:cxnSp>
+        <p:nvCxnSpPr>
+          <p:cNvPr id="15" name="직선 화살표 연결선 14">
+            <a:extLst>
+              <a:ext uri="{FF2B5EF4-FFF2-40B4-BE49-F238E27FC236}">
+                <a16:creationId xmlns:a16="http://schemas.microsoft.com/office/drawing/2014/main" id="{EB09BD6B-2D06-DC57-BCCE-830F58840380}"/>
+              </a:ext>
+            </a:extLst>
+          </p:cNvPr>
+          <p:cNvCxnSpPr>
+            <a:cxnSpLocks/>
+            <a:stCxn id="7" idx="2"/>
+            <a:endCxn id="9" idx="5"/>
+          </p:cNvCxnSpPr>
+          <p:nvPr/>
+        </p:nvCxnSpPr>
+        <p:spPr>
+          <a:xfrm flipH="1">
+            <a:off x="1941201" y="3535417"/>
+            <a:ext cx="4487762" cy="47656"/>
+          </a:xfrm>
+          <a:prstGeom prst="straightConnector1">
+            <a:avLst/>
+          </a:prstGeom>
+          <a:ln>
+            <a:tailEnd type="triangle"/>
+          </a:ln>
+        </p:spPr>
+        <p:style>
+          <a:lnRef idx="3">
+            <a:schemeClr val="accent4"/>
+          </a:lnRef>
+          <a:fillRef idx="0">
+            <a:schemeClr val="accent4"/>
+          </a:fillRef>
+          <a:effectRef idx="2">
+            <a:schemeClr val="accent4"/>
+          </a:effectRef>
+          <a:fontRef idx="minor">
+            <a:schemeClr val="tx1"/>
+          </a:fontRef>
+        </p:style>
+      </p:cxnSp>
+      <p:cxnSp>
+        <p:nvCxnSpPr>
+          <p:cNvPr id="26" name="구부러진 연결선[U] 25">
+            <a:extLst>
+              <a:ext uri="{FF2B5EF4-FFF2-40B4-BE49-F238E27FC236}">
+                <a16:creationId xmlns:a16="http://schemas.microsoft.com/office/drawing/2014/main" id="{3C94107B-DD19-38C3-FE99-B7CD74285F75}"/>
+              </a:ext>
+            </a:extLst>
+          </p:cNvPr>
+          <p:cNvCxnSpPr>
+            <a:stCxn id="9" idx="4"/>
+            <a:endCxn id="18" idx="2"/>
+          </p:cNvCxnSpPr>
+          <p:nvPr/>
+        </p:nvCxnSpPr>
+        <p:spPr>
+          <a:xfrm rot="5400000" flipH="1" flipV="1">
+            <a:off x="5639039" y="-658503"/>
+            <a:ext cx="271643" cy="8596311"/>
+          </a:xfrm>
+          <a:prstGeom prst="curvedConnector3">
+            <a:avLst>
+              <a:gd name="adj1" fmla="val -84155"/>
+            </a:avLst>
+          </a:prstGeom>
+          <a:ln>
+            <a:tailEnd type="triangle"/>
+          </a:ln>
+        </p:spPr>
+        <p:style>
+          <a:lnRef idx="3">
             <a:schemeClr val="accent2"/>
+          </a:lnRef>
+          <a:fillRef idx="0">
+            <a:schemeClr val="accent2"/>
+          </a:fillRef>
+          <a:effectRef idx="2">
+            <a:schemeClr val="accent2"/>
+          </a:effectRef>
+          <a:fontRef idx="minor">
+            <a:schemeClr val="tx1"/>
+          </a:fontRef>
+        </p:style>
+      </p:cxnSp>
+      <p:sp>
+        <p:nvSpPr>
+          <p:cNvPr id="27" name="TextBox 26">
+            <a:extLst>
+              <a:ext uri="{FF2B5EF4-FFF2-40B4-BE49-F238E27FC236}">
+                <a16:creationId xmlns:a16="http://schemas.microsoft.com/office/drawing/2014/main" id="{2ECC67E2-C8A2-2F6D-CF7F-4FD1ACEAF1C1}"/>
+              </a:ext>
+            </a:extLst>
+          </p:cNvPr>
+          <p:cNvSpPr txBox="1"/>
+          <p:nvPr/>
+        </p:nvSpPr>
+        <p:spPr>
+          <a:xfrm>
+            <a:off x="3095867" y="2599106"/>
+            <a:ext cx="1742090" cy="369332"/>
+          </a:xfrm>
+          <a:prstGeom prst="rect">
+            <a:avLst/>
+          </a:prstGeom>
+        </p:spPr>
+        <p:style>
+          <a:lnRef idx="2">
+            <a:schemeClr val="accent4"/>
+          </a:lnRef>
+          <a:fillRef idx="1">
+            <a:schemeClr val="lt1"/>
+          </a:fillRef>
+          <a:effectRef idx="0">
+            <a:schemeClr val="accent4"/>
+          </a:effectRef>
+          <a:fontRef idx="minor">
+            <a:schemeClr val="dk1"/>
+          </a:fontRef>
+        </p:style>
+        <p:txBody>
+          <a:bodyPr wrap="square" rtlCol="0">
+            <a:spAutoFit/>
+          </a:bodyPr>
+          <a:lstStyle/>
+          <a:p>
+            <a:r>
+              <a:rPr kumimoji="1" lang="en-US" altLang="ko-Kore-KR" dirty="0"/>
+              <a:t>1. iterator()</a:t>
+            </a:r>
+          </a:p>
+        </p:txBody>
+      </p:sp>
+      <p:sp>
+        <p:nvSpPr>
+          <p:cNvPr id="28" name="TextBox 27">
+            <a:extLst>
+              <a:ext uri="{FF2B5EF4-FFF2-40B4-BE49-F238E27FC236}">
+                <a16:creationId xmlns:a16="http://schemas.microsoft.com/office/drawing/2014/main" id="{A8969F77-94AC-C2A1-A069-1C13A4194908}"/>
+              </a:ext>
+            </a:extLst>
+          </p:cNvPr>
+          <p:cNvSpPr txBox="1"/>
+          <p:nvPr/>
+        </p:nvSpPr>
+        <p:spPr>
+          <a:xfrm>
+            <a:off x="7484680" y="2487220"/>
+            <a:ext cx="1134706" cy="369332"/>
+          </a:xfrm>
+          <a:prstGeom prst="rect">
+            <a:avLst/>
+          </a:prstGeom>
+        </p:spPr>
+        <p:style>
+          <a:lnRef idx="2">
+            <a:schemeClr val="accent5"/>
+          </a:lnRef>
+          <a:fillRef idx="1">
+            <a:schemeClr val="lt1"/>
+          </a:fillRef>
+          <a:effectRef idx="0">
+            <a:schemeClr val="accent5"/>
+          </a:effectRef>
+          <a:fontRef idx="minor">
+            <a:schemeClr val="dk1"/>
+          </a:fontRef>
+        </p:style>
+        <p:txBody>
+          <a:bodyPr wrap="square" rtlCol="0">
+            <a:spAutoFit/>
+          </a:bodyPr>
+          <a:lstStyle/>
+          <a:p>
+            <a:r>
+              <a:rPr kumimoji="1" lang="en-US" altLang="ko-Kore-KR" dirty="0"/>
+              <a:t>2. new</a:t>
+            </a:r>
+          </a:p>
+        </p:txBody>
+      </p:sp>
+      <p:sp>
+        <p:nvSpPr>
+          <p:cNvPr id="29" name="TextBox 28">
+            <a:extLst>
+              <a:ext uri="{FF2B5EF4-FFF2-40B4-BE49-F238E27FC236}">
+                <a16:creationId xmlns:a16="http://schemas.microsoft.com/office/drawing/2014/main" id="{979DAA10-BB6E-6726-80BE-B1CE7DEB16D9}"/>
+              </a:ext>
+            </a:extLst>
+          </p:cNvPr>
+          <p:cNvSpPr txBox="1"/>
+          <p:nvPr/>
+        </p:nvSpPr>
+        <p:spPr>
+          <a:xfrm>
+            <a:off x="3092791" y="3381125"/>
+            <a:ext cx="1742090" cy="369332"/>
+          </a:xfrm>
+          <a:prstGeom prst="rect">
+            <a:avLst/>
+          </a:prstGeom>
+        </p:spPr>
+        <p:style>
+          <a:lnRef idx="2">
+            <a:schemeClr val="accent4"/>
+          </a:lnRef>
+          <a:fillRef idx="1">
+            <a:schemeClr val="lt1"/>
+          </a:fillRef>
+          <a:effectRef idx="0">
+            <a:schemeClr val="accent4"/>
+          </a:effectRef>
+          <a:fontRef idx="minor">
+            <a:schemeClr val="dk1"/>
+          </a:fontRef>
+        </p:style>
+        <p:txBody>
+          <a:bodyPr wrap="square" rtlCol="0">
+            <a:spAutoFit/>
+          </a:bodyPr>
+          <a:lstStyle/>
+          <a:p>
+            <a:r>
+              <a:rPr kumimoji="1" lang="en-US" altLang="ko-Kore-KR" dirty="0"/>
+              <a:t>3. Iterator </a:t>
+            </a:r>
+            <a:r>
+              <a:rPr kumimoji="1" lang="ko-Kore-KR" altLang="en-US" dirty="0"/>
+              <a:t>리턴</a:t>
+            </a:r>
+            <a:endParaRPr kumimoji="1" lang="en-US" altLang="ko-Kore-KR" dirty="0"/>
+          </a:p>
+        </p:txBody>
+      </p:sp>
+      <p:sp>
+        <p:nvSpPr>
+          <p:cNvPr id="14" name="TextBox 13">
+            <a:extLst>
+              <a:ext uri="{FF2B5EF4-FFF2-40B4-BE49-F238E27FC236}">
+                <a16:creationId xmlns:a16="http://schemas.microsoft.com/office/drawing/2014/main" id="{12424D5B-79B7-CF39-074C-257708FF3616}"/>
+              </a:ext>
+            </a:extLst>
+          </p:cNvPr>
+          <p:cNvSpPr txBox="1"/>
+          <p:nvPr/>
+        </p:nvSpPr>
+        <p:spPr>
+          <a:xfrm>
+            <a:off x="5601273" y="3720082"/>
+            <a:ext cx="1742090" cy="646331"/>
+          </a:xfrm>
+          <a:prstGeom prst="rect">
+            <a:avLst/>
+          </a:prstGeom>
+        </p:spPr>
+        <p:style>
+          <a:lnRef idx="2">
+            <a:schemeClr val="accent2"/>
+          </a:lnRef>
+          <a:fillRef idx="1">
+            <a:schemeClr val="lt1"/>
           </a:fillRef>
           <a:effectRef idx="0">
             <a:schemeClr val="accent2"/>
           </a:effectRef>
           <a:fontRef idx="minor">
-            <a:schemeClr val="lt1"/>
+            <a:schemeClr val="dk1"/>
           </a:fontRef>
         </p:style>
         <p:txBody>
-          <a:bodyPr rtlCol="0" anchor="ctr"/>
-          <a:lstStyle/>
-          <a:p>
-            <a:pPr algn="ctr"/>
-            <a:r>
-              <a:rPr kumimoji="1" lang="en-US" altLang="ko-Kore-KR" dirty="0"/>
-              <a:t>LinkedList</a:t>
+          <a:bodyPr wrap="square" rtlCol="0">
+            <a:spAutoFit/>
+          </a:bodyPr>
+          <a:lstStyle/>
+          <a:p>
+            <a:r>
+              <a:rPr kumimoji="1" lang="en-US" altLang="ko-KR" dirty="0"/>
+              <a:t>4.</a:t>
             </a:r>
             <a:r>
               <a:rPr kumimoji="1" lang="ko-KR" altLang="en-US" dirty="0"/>
               <a:t> </a:t>
             </a:r>
             <a:r>
-              <a:rPr kumimoji="1" lang="en-US" altLang="ko-KR" dirty="0"/>
-              <a:t>&lt;Board&gt;</a:t>
+              <a:rPr kumimoji="1" lang="en-US" altLang="ko-Kore-KR" dirty="0"/>
+              <a:t>if(</a:t>
+            </a:r>
+            <a:r>
+              <a:rPr kumimoji="1" lang="en-US" altLang="ko-Kore-KR" dirty="0" err="1"/>
+              <a:t>hasNext</a:t>
+            </a:r>
+            <a:r>
+              <a:rPr kumimoji="1" lang="en-US" altLang="ko-Kore-KR" dirty="0"/>
+              <a:t>())</a:t>
+            </a:r>
+          </a:p>
+          <a:p>
+            <a:r>
+              <a:rPr kumimoji="1" lang="en-US" altLang="ko-Kore-KR" dirty="0">
+                <a:sym typeface="Wingdings" pitchFamily="2" charset="2"/>
+              </a:rPr>
+              <a:t> next();</a:t>
             </a:r>
             <a:endParaRPr kumimoji="1" lang="ko-Kore-KR" altLang="en-US" dirty="0"/>
           </a:p>
@@ -6309,43 +5718,44 @@
       </p:sp>
       <p:cxnSp>
         <p:nvCxnSpPr>
-          <p:cNvPr id="6" name="직선 화살표 연결선 5">
-            <a:extLst>
-              <a:ext uri="{FF2B5EF4-FFF2-40B4-BE49-F238E27FC236}">
-                <a16:creationId xmlns:a16="http://schemas.microsoft.com/office/drawing/2014/main" id="{AF16B19E-2FB8-92A5-2F0D-CE48CE4BF90C}"/>
+          <p:cNvPr id="31" name="구부러진 연결선[U] 30">
+            <a:extLst>
+              <a:ext uri="{FF2B5EF4-FFF2-40B4-BE49-F238E27FC236}">
+                <a16:creationId xmlns:a16="http://schemas.microsoft.com/office/drawing/2014/main" id="{A3255819-DEB2-5CD0-4DDC-33CC23496067}"/>
               </a:ext>
             </a:extLst>
           </p:cNvPr>
           <p:cNvCxnSpPr>
-            <a:cxnSpLocks/>
-            <a:stCxn id="257" idx="3"/>
-            <a:endCxn id="5" idx="1"/>
+            <a:stCxn id="18" idx="0"/>
+            <a:endCxn id="7" idx="0"/>
           </p:cNvCxnSpPr>
           <p:nvPr/>
         </p:nvCxnSpPr>
         <p:spPr>
-          <a:xfrm>
-            <a:off x="3356759" y="2167759"/>
-            <a:ext cx="2150662" cy="1608081"/>
-          </a:xfrm>
-          <a:prstGeom prst="straightConnector1">
-            <a:avLst/>
+          <a:xfrm rot="16200000" flipV="1">
+            <a:off x="8250990" y="1035473"/>
+            <a:ext cx="12700" cy="3644054"/>
+          </a:xfrm>
+          <a:prstGeom prst="curvedConnector3">
+            <a:avLst>
+              <a:gd name="adj1" fmla="val 9000000"/>
+            </a:avLst>
           </a:prstGeom>
           <a:ln>
             <a:solidFill>
-              <a:schemeClr val="accent2"/>
+              <a:srgbClr val="FF0000"/>
             </a:solidFill>
             <a:tailEnd type="triangle"/>
           </a:ln>
         </p:spPr>
         <p:style>
-          <a:lnRef idx="3">
+          <a:lnRef idx="1">
             <a:schemeClr val="accent1"/>
           </a:lnRef>
           <a:fillRef idx="0">
             <a:schemeClr val="accent1"/>
           </a:fillRef>
-          <a:effectRef idx="2">
+          <a:effectRef idx="0">
             <a:schemeClr val="accent1"/>
           </a:effectRef>
           <a:fontRef idx="minor">
@@ -6355,10 +5765,147 @@
       </p:cxnSp>
       <p:sp>
         <p:nvSpPr>
-          <p:cNvPr id="2" name="직사각형 1">
-            <a:extLst>
-              <a:ext uri="{FF2B5EF4-FFF2-40B4-BE49-F238E27FC236}">
-                <a16:creationId xmlns:a16="http://schemas.microsoft.com/office/drawing/2014/main" id="{7236A2F3-EB7D-DE3F-AA34-C017D8257C31}"/>
+          <p:cNvPr id="33" name="TextBox 32">
+            <a:extLst>
+              <a:ext uri="{FF2B5EF4-FFF2-40B4-BE49-F238E27FC236}">
+                <a16:creationId xmlns:a16="http://schemas.microsoft.com/office/drawing/2014/main" id="{5942CE1F-CF23-3A9A-EDD8-85E6D59249BD}"/>
+              </a:ext>
+            </a:extLst>
+          </p:cNvPr>
+          <p:cNvSpPr txBox="1"/>
+          <p:nvPr/>
+        </p:nvSpPr>
+        <p:spPr>
+          <a:xfrm>
+            <a:off x="7708019" y="1573427"/>
+            <a:ext cx="1134706" cy="369332"/>
+          </a:xfrm>
+          <a:prstGeom prst="rect">
+            <a:avLst/>
+          </a:prstGeom>
+          <a:ln>
+            <a:solidFill>
+              <a:srgbClr val="FF0000"/>
+            </a:solidFill>
+          </a:ln>
+        </p:spPr>
+        <p:style>
+          <a:lnRef idx="2">
+            <a:schemeClr val="accent5"/>
+          </a:lnRef>
+          <a:fillRef idx="1">
+            <a:schemeClr val="lt1"/>
+          </a:fillRef>
+          <a:effectRef idx="0">
+            <a:schemeClr val="accent5"/>
+          </a:effectRef>
+          <a:fontRef idx="minor">
+            <a:schemeClr val="dk1"/>
+          </a:fontRef>
+        </p:style>
+        <p:txBody>
+          <a:bodyPr wrap="square" rtlCol="0">
+            <a:spAutoFit/>
+          </a:bodyPr>
+          <a:lstStyle/>
+          <a:p>
+            <a:r>
+              <a:rPr kumimoji="1" lang="en-US" altLang="ko-KR" dirty="0"/>
+              <a:t>this</a:t>
+            </a:r>
+            <a:r>
+              <a:rPr kumimoji="1" lang="ko-KR" altLang="en-US" dirty="0"/>
+              <a:t> 이용</a:t>
+            </a:r>
+            <a:endParaRPr kumimoji="1" lang="en-US" altLang="ko-Kore-KR" dirty="0"/>
+          </a:p>
+        </p:txBody>
+      </p:sp>
+    </p:spTree>
+    <p:extLst>
+      <p:ext uri="{BB962C8B-B14F-4D97-AF65-F5344CB8AC3E}">
+        <p14:creationId xmlns:p14="http://schemas.microsoft.com/office/powerpoint/2010/main" val="1111160965"/>
+      </p:ext>
+    </p:extLst>
+  </p:cSld>
+  <p:clrMapOvr>
+    <a:masterClrMapping/>
+  </p:clrMapOvr>
+</p:sld>
+</file>
+
+<file path=ppt/slides/slide5.xml><?xml version="1.0" encoding="utf-8"?>
+<p:sld xmlns:a="http://schemas.openxmlformats.org/drawingml/2006/main" xmlns:r="http://schemas.openxmlformats.org/officeDocument/2006/relationships" xmlns:p="http://schemas.openxmlformats.org/presentationml/2006/main">
+  <p:cSld>
+    <p:spTree>
+      <p:nvGrpSpPr>
+        <p:cNvPr id="1" name=""/>
+        <p:cNvGrpSpPr/>
+        <p:nvPr/>
+      </p:nvGrpSpPr>
+      <p:grpSpPr>
+        <a:xfrm>
+          <a:off x="0" y="0"/>
+          <a:ext cx="0" cy="0"/>
+          <a:chOff x="0" y="0"/>
+          <a:chExt cx="0" cy="0"/>
+        </a:xfrm>
+      </p:grpSpPr>
+      <p:cxnSp>
+        <p:nvCxnSpPr>
+          <p:cNvPr id="75" name="직선 화살표 연결선 74">
+            <a:extLst>
+              <a:ext uri="{FF2B5EF4-FFF2-40B4-BE49-F238E27FC236}">
+                <a16:creationId xmlns:a16="http://schemas.microsoft.com/office/drawing/2014/main" id="{6D35E7B3-3A74-489D-2B33-6F19BBD938EE}"/>
+              </a:ext>
+            </a:extLst>
+          </p:cNvPr>
+          <p:cNvCxnSpPr>
+            <a:cxnSpLocks/>
+            <a:stCxn id="10" idx="0"/>
+            <a:endCxn id="74" idx="2"/>
+          </p:cNvCxnSpPr>
+          <p:nvPr/>
+        </p:nvCxnSpPr>
+        <p:spPr>
+          <a:xfrm flipV="1">
+            <a:off x="4218579" y="773136"/>
+            <a:ext cx="1" cy="5033830"/>
+          </a:xfrm>
+          <a:prstGeom prst="straightConnector1">
+            <a:avLst/>
+          </a:prstGeom>
+          <a:ln w="9525" cap="flat" cmpd="sng" algn="ctr">
+            <a:solidFill>
+              <a:schemeClr val="accent3"/>
+            </a:solidFill>
+            <a:prstDash val="dash"/>
+            <a:round/>
+            <a:headEnd type="none" w="med" len="med"/>
+            <a:tailEnd type="none" w="med" len="med"/>
+          </a:ln>
+        </p:spPr>
+        <p:style>
+          <a:lnRef idx="0">
+            <a:scrgbClr r="0" g="0" b="0"/>
+          </a:lnRef>
+          <a:fillRef idx="0">
+            <a:scrgbClr r="0" g="0" b="0"/>
+          </a:fillRef>
+          <a:effectRef idx="0">
+            <a:scrgbClr r="0" g="0" b="0"/>
+          </a:effectRef>
+          <a:fontRef idx="minor">
+            <a:schemeClr val="tx1"/>
+          </a:fontRef>
+        </p:style>
+      </p:cxnSp>
+      <p:sp>
+        <p:nvSpPr>
+          <p:cNvPr id="4" name="직사각형 3">
+            <a:extLst>
+              <a:ext uri="{FF2B5EF4-FFF2-40B4-BE49-F238E27FC236}">
+                <a16:creationId xmlns:a16="http://schemas.microsoft.com/office/drawing/2014/main" id="{92D1EBF9-BF79-C348-542E-7867D7EFD64A}"/>
               </a:ext>
             </a:extLst>
           </p:cNvPr>
@@ -6367,8 +5914,8 @@
         </p:nvSpPr>
         <p:spPr>
           <a:xfrm>
-            <a:off x="1170607" y="4518367"/>
-            <a:ext cx="2186152" cy="1072055"/>
+            <a:off x="3148494" y="1573926"/>
+            <a:ext cx="2140173" cy="677917"/>
           </a:xfrm>
           <a:prstGeom prst="rect">
             <a:avLst/>
@@ -6397,15 +5944,7 @@
             <a:pPr algn="ctr"/>
             <a:r>
               <a:rPr kumimoji="1" lang="en-US" altLang="ko-Kore-KR" dirty="0" err="1"/>
-              <a:t>MemberDao</a:t>
-            </a:r>
-            <a:endParaRPr kumimoji="1" lang="en-US" altLang="ko-Kore-KR" dirty="0"/>
-          </a:p>
-          <a:p>
-            <a:pPr algn="ctr"/>
-            <a:r>
-              <a:rPr kumimoji="1" lang="en-US" altLang="ko-Kore-KR" dirty="0"/>
-              <a:t>class</a:t>
+              <a:t>ArrayListIterator</a:t>
             </a:r>
             <a:endParaRPr kumimoji="1" lang="ko-Kore-KR" altLang="en-US" dirty="0"/>
           </a:p>
@@ -6413,10 +5952,10 @@
       </p:sp>
       <p:sp>
         <p:nvSpPr>
-          <p:cNvPr id="3" name="직사각형 2">
-            <a:extLst>
-              <a:ext uri="{FF2B5EF4-FFF2-40B4-BE49-F238E27FC236}">
-                <a16:creationId xmlns:a16="http://schemas.microsoft.com/office/drawing/2014/main" id="{FD823ED8-E831-769F-4674-51EF6566E017}"/>
+          <p:cNvPr id="7" name="직사각형 6">
+            <a:extLst>
+              <a:ext uri="{FF2B5EF4-FFF2-40B4-BE49-F238E27FC236}">
+                <a16:creationId xmlns:a16="http://schemas.microsoft.com/office/drawing/2014/main" id="{FE0F70A9-B948-5105-6F83-EF9C136BC26D}"/>
               </a:ext>
             </a:extLst>
           </p:cNvPr>
@@ -6425,169 +5964,12 @@
         </p:nvSpPr>
         <p:spPr>
           <a:xfrm>
-            <a:off x="5510938" y="4518368"/>
-            <a:ext cx="3415862" cy="1072055"/>
+            <a:off x="3148493" y="2609195"/>
+            <a:ext cx="2140173" cy="677917"/>
           </a:xfrm>
           <a:prstGeom prst="rect">
             <a:avLst/>
           </a:prstGeom>
-        </p:spPr>
-        <p:style>
-          <a:lnRef idx="2">
-            <a:schemeClr val="accent6">
-              <a:shade val="50000"/>
-            </a:schemeClr>
-          </a:lnRef>
-          <a:fillRef idx="1">
-            <a:schemeClr val="accent6"/>
-          </a:fillRef>
-          <a:effectRef idx="0">
-            <a:schemeClr val="accent6"/>
-          </a:effectRef>
-          <a:fontRef idx="minor">
-            <a:schemeClr val="lt1"/>
-          </a:fontRef>
-        </p:style>
-        <p:txBody>
-          <a:bodyPr rtlCol="0" anchor="ctr"/>
-          <a:lstStyle/>
-          <a:p>
-            <a:pPr algn="ctr"/>
-            <a:r>
-              <a:rPr kumimoji="1" lang="en-US" altLang="ko-Kore-KR" dirty="0"/>
-              <a:t>LinkedList</a:t>
-            </a:r>
-            <a:r>
-              <a:rPr kumimoji="1" lang="ko-KR" altLang="en-US" dirty="0"/>
-              <a:t> </a:t>
-            </a:r>
-            <a:r>
-              <a:rPr kumimoji="1" lang="en-US" altLang="ko-KR"/>
-              <a:t>&lt;Member&gt;</a:t>
-            </a:r>
-            <a:endParaRPr kumimoji="1" lang="ko-Kore-KR" altLang="en-US" dirty="0"/>
-          </a:p>
-        </p:txBody>
-      </p:sp>
-      <p:cxnSp>
-        <p:nvCxnSpPr>
-          <p:cNvPr id="4" name="직선 화살표 연결선 3">
-            <a:extLst>
-              <a:ext uri="{FF2B5EF4-FFF2-40B4-BE49-F238E27FC236}">
-                <a16:creationId xmlns:a16="http://schemas.microsoft.com/office/drawing/2014/main" id="{C1621A26-4339-483C-0D25-CFDC3507D7BC}"/>
-              </a:ext>
-            </a:extLst>
-          </p:cNvPr>
-          <p:cNvCxnSpPr>
-            <a:cxnSpLocks/>
-            <a:stCxn id="2" idx="3"/>
-            <a:endCxn id="3" idx="1"/>
-          </p:cNvCxnSpPr>
-          <p:nvPr/>
-        </p:nvCxnSpPr>
-        <p:spPr>
-          <a:xfrm>
-            <a:off x="3356759" y="5054395"/>
-            <a:ext cx="2154179" cy="1"/>
-          </a:xfrm>
-          <a:prstGeom prst="straightConnector1">
-            <a:avLst/>
-          </a:prstGeom>
-          <a:ln>
-            <a:tailEnd type="triangle"/>
-          </a:ln>
-        </p:spPr>
-        <p:style>
-          <a:lnRef idx="2">
-            <a:schemeClr val="accent6">
-              <a:shade val="50000"/>
-            </a:schemeClr>
-          </a:lnRef>
-          <a:fillRef idx="1">
-            <a:schemeClr val="accent6"/>
-          </a:fillRef>
-          <a:effectRef idx="0">
-            <a:schemeClr val="accent6"/>
-          </a:effectRef>
-          <a:fontRef idx="minor">
-            <a:schemeClr val="lt1"/>
-          </a:fontRef>
-        </p:style>
-      </p:cxnSp>
-      <p:cxnSp>
-        <p:nvCxnSpPr>
-          <p:cNvPr id="10" name="직선 화살표 연결선 9">
-            <a:extLst>
-              <a:ext uri="{FF2B5EF4-FFF2-40B4-BE49-F238E27FC236}">
-                <a16:creationId xmlns:a16="http://schemas.microsoft.com/office/drawing/2014/main" id="{300CAF16-4E51-E20D-557B-D106E782139F}"/>
-              </a:ext>
-            </a:extLst>
-          </p:cNvPr>
-          <p:cNvCxnSpPr>
-            <a:cxnSpLocks/>
-            <a:stCxn id="2" idx="3"/>
-          </p:cNvCxnSpPr>
-          <p:nvPr/>
-        </p:nvCxnSpPr>
-        <p:spPr>
-          <a:xfrm flipV="1">
-            <a:off x="3356759" y="2167757"/>
-            <a:ext cx="2585545" cy="2886638"/>
-          </a:xfrm>
-          <a:prstGeom prst="straightConnector1">
-            <a:avLst/>
-          </a:prstGeom>
-          <a:ln>
-            <a:tailEnd type="triangle"/>
-          </a:ln>
-        </p:spPr>
-        <p:style>
-          <a:lnRef idx="3">
-            <a:schemeClr val="accent1"/>
-          </a:lnRef>
-          <a:fillRef idx="0">
-            <a:schemeClr val="accent1"/>
-          </a:fillRef>
-          <a:effectRef idx="2">
-            <a:schemeClr val="accent1"/>
-          </a:effectRef>
-          <a:fontRef idx="minor">
-            <a:schemeClr val="tx1"/>
-          </a:fontRef>
-        </p:style>
-      </p:cxnSp>
-      <p:sp>
-        <p:nvSpPr>
-          <p:cNvPr id="13" name="곱하기 12">
-            <a:extLst>
-              <a:ext uri="{FF2B5EF4-FFF2-40B4-BE49-F238E27FC236}">
-                <a16:creationId xmlns:a16="http://schemas.microsoft.com/office/drawing/2014/main" id="{F88D150E-0F31-115C-67EC-8D7AFB57935A}"/>
-              </a:ext>
-            </a:extLst>
-          </p:cNvPr>
-          <p:cNvSpPr/>
-          <p:nvPr/>
-        </p:nvSpPr>
-        <p:spPr>
-          <a:xfrm>
-            <a:off x="2427889" y="1337411"/>
-            <a:ext cx="9038896" cy="1534510"/>
-          </a:xfrm>
-          <a:prstGeom prst="mathMultiply">
-            <a:avLst/>
-          </a:prstGeom>
-          <a:solidFill>
-            <a:srgbClr val="FDA9F7">
-              <a:alpha val="68000"/>
-            </a:srgbClr>
-          </a:solidFill>
-          <a:ln>
-            <a:solidFill>
-              <a:schemeClr val="accent1">
-                <a:shade val="50000"/>
-              </a:schemeClr>
-            </a:solidFill>
-          </a:ln>
         </p:spPr>
         <p:style>
           <a:lnRef idx="2">
@@ -6610,14 +5992,729 @@
           <a:lstStyle/>
           <a:p>
             <a:pPr algn="ctr"/>
+            <a:r>
+              <a:rPr kumimoji="1" lang="en-US" altLang="ko-Kore-KR" dirty="0" err="1"/>
+              <a:t>LinkedListIterator</a:t>
+            </a:r>
             <a:endParaRPr kumimoji="1" lang="ko-Kore-KR" altLang="en-US" dirty="0"/>
+          </a:p>
+        </p:txBody>
+      </p:sp>
+      <p:sp>
+        <p:nvSpPr>
+          <p:cNvPr id="8" name="직사각형 7">
+            <a:extLst>
+              <a:ext uri="{FF2B5EF4-FFF2-40B4-BE49-F238E27FC236}">
+                <a16:creationId xmlns:a16="http://schemas.microsoft.com/office/drawing/2014/main" id="{40FFE58C-54FD-E225-41DA-D6A8FEFDFD88}"/>
+              </a:ext>
+            </a:extLst>
+          </p:cNvPr>
+          <p:cNvSpPr/>
+          <p:nvPr/>
+        </p:nvSpPr>
+        <p:spPr>
+          <a:xfrm>
+            <a:off x="3148492" y="3690446"/>
+            <a:ext cx="2140173" cy="677917"/>
+          </a:xfrm>
+          <a:prstGeom prst="rect">
+            <a:avLst/>
+          </a:prstGeom>
+        </p:spPr>
+        <p:style>
+          <a:lnRef idx="2">
+            <a:schemeClr val="accent1">
+              <a:shade val="50000"/>
+            </a:schemeClr>
+          </a:lnRef>
+          <a:fillRef idx="1">
+            <a:schemeClr val="accent1"/>
+          </a:fillRef>
+          <a:effectRef idx="0">
+            <a:schemeClr val="accent1"/>
+          </a:effectRef>
+          <a:fontRef idx="minor">
+            <a:schemeClr val="lt1"/>
+          </a:fontRef>
+        </p:style>
+        <p:txBody>
+          <a:bodyPr rtlCol="0" anchor="ctr"/>
+          <a:lstStyle/>
+          <a:p>
+            <a:pPr algn="ctr"/>
+            <a:r>
+              <a:rPr kumimoji="1" lang="en-US" altLang="ko-Kore-KR" dirty="0" err="1"/>
+              <a:t>StackIterator</a:t>
+            </a:r>
+            <a:endParaRPr kumimoji="1" lang="ko-Kore-KR" altLang="en-US" dirty="0"/>
+          </a:p>
+        </p:txBody>
+      </p:sp>
+      <p:sp>
+        <p:nvSpPr>
+          <p:cNvPr id="9" name="직사각형 8">
+            <a:extLst>
+              <a:ext uri="{FF2B5EF4-FFF2-40B4-BE49-F238E27FC236}">
+                <a16:creationId xmlns:a16="http://schemas.microsoft.com/office/drawing/2014/main" id="{7E4B8974-D4EB-E905-0ED3-2D2DDC9365F0}"/>
+              </a:ext>
+            </a:extLst>
+          </p:cNvPr>
+          <p:cNvSpPr/>
+          <p:nvPr/>
+        </p:nvSpPr>
+        <p:spPr>
+          <a:xfrm>
+            <a:off x="3148492" y="4725715"/>
+            <a:ext cx="2140173" cy="677917"/>
+          </a:xfrm>
+          <a:prstGeom prst="rect">
+            <a:avLst/>
+          </a:prstGeom>
+        </p:spPr>
+        <p:style>
+          <a:lnRef idx="2">
+            <a:schemeClr val="accent1">
+              <a:shade val="50000"/>
+            </a:schemeClr>
+          </a:lnRef>
+          <a:fillRef idx="1">
+            <a:schemeClr val="accent1"/>
+          </a:fillRef>
+          <a:effectRef idx="0">
+            <a:schemeClr val="accent1"/>
+          </a:effectRef>
+          <a:fontRef idx="minor">
+            <a:schemeClr val="lt1"/>
+          </a:fontRef>
+        </p:style>
+        <p:txBody>
+          <a:bodyPr rtlCol="0" anchor="ctr"/>
+          <a:lstStyle/>
+          <a:p>
+            <a:pPr algn="ctr"/>
+            <a:r>
+              <a:rPr kumimoji="1" lang="en-US" altLang="ko-Kore-KR" dirty="0" err="1"/>
+              <a:t>QueueIterator</a:t>
+            </a:r>
+            <a:endParaRPr kumimoji="1" lang="ko-Kore-KR" altLang="en-US" dirty="0"/>
+          </a:p>
+        </p:txBody>
+      </p:sp>
+      <p:sp>
+        <p:nvSpPr>
+          <p:cNvPr id="10" name="직사각형 9">
+            <a:extLst>
+              <a:ext uri="{FF2B5EF4-FFF2-40B4-BE49-F238E27FC236}">
+                <a16:creationId xmlns:a16="http://schemas.microsoft.com/office/drawing/2014/main" id="{071F57C6-F048-0718-D255-C12E543ACF94}"/>
+              </a:ext>
+            </a:extLst>
+          </p:cNvPr>
+          <p:cNvSpPr/>
+          <p:nvPr/>
+        </p:nvSpPr>
+        <p:spPr>
+          <a:xfrm>
+            <a:off x="3148492" y="5806966"/>
+            <a:ext cx="2140173" cy="677917"/>
+          </a:xfrm>
+          <a:prstGeom prst="rect">
+            <a:avLst/>
+          </a:prstGeom>
+        </p:spPr>
+        <p:style>
+          <a:lnRef idx="2">
+            <a:schemeClr val="accent1">
+              <a:shade val="50000"/>
+            </a:schemeClr>
+          </a:lnRef>
+          <a:fillRef idx="1">
+            <a:schemeClr val="accent1"/>
+          </a:fillRef>
+          <a:effectRef idx="0">
+            <a:schemeClr val="accent1"/>
+          </a:effectRef>
+          <a:fontRef idx="minor">
+            <a:schemeClr val="lt1"/>
+          </a:fontRef>
+        </p:style>
+        <p:txBody>
+          <a:bodyPr rtlCol="0" anchor="ctr"/>
+          <a:lstStyle/>
+          <a:p>
+            <a:pPr algn="ctr"/>
+            <a:r>
+              <a:rPr kumimoji="1" lang="en-US" altLang="ko-Kore-KR" dirty="0" err="1"/>
+              <a:t>HashSetIterator</a:t>
+            </a:r>
+            <a:endParaRPr kumimoji="1" lang="ko-Kore-KR" altLang="en-US" dirty="0"/>
+          </a:p>
+        </p:txBody>
+      </p:sp>
+      <p:sp>
+        <p:nvSpPr>
+          <p:cNvPr id="18" name="TextBox 17">
+            <a:extLst>
+              <a:ext uri="{FF2B5EF4-FFF2-40B4-BE49-F238E27FC236}">
+                <a16:creationId xmlns:a16="http://schemas.microsoft.com/office/drawing/2014/main" id="{4F232CB8-A83C-2EFF-9850-CE4F847D5AAA}"/>
+              </a:ext>
+            </a:extLst>
+          </p:cNvPr>
+          <p:cNvSpPr txBox="1"/>
+          <p:nvPr/>
+        </p:nvSpPr>
+        <p:spPr>
+          <a:xfrm>
+            <a:off x="9247136" y="3706238"/>
+            <a:ext cx="1374230" cy="646331"/>
+          </a:xfrm>
+          <a:prstGeom prst="rect">
+            <a:avLst/>
+          </a:prstGeom>
+        </p:spPr>
+        <p:style>
+          <a:lnRef idx="2">
+            <a:schemeClr val="accent5">
+              <a:shade val="50000"/>
+            </a:schemeClr>
+          </a:lnRef>
+          <a:fillRef idx="1">
+            <a:schemeClr val="accent5"/>
+          </a:fillRef>
+          <a:effectRef idx="0">
+            <a:schemeClr val="accent5"/>
+          </a:effectRef>
+          <a:fontRef idx="minor">
+            <a:schemeClr val="lt1"/>
+          </a:fontRef>
+        </p:style>
+        <p:txBody>
+          <a:bodyPr wrap="square" rtlCol="0">
+            <a:spAutoFit/>
+          </a:bodyPr>
+          <a:lstStyle/>
+          <a:p>
+            <a:pPr algn="ctr"/>
+            <a:r>
+              <a:rPr kumimoji="1" lang="en-US" altLang="ko-Kore-KR" dirty="0"/>
+              <a:t>Iterator</a:t>
+            </a:r>
+          </a:p>
+          <a:p>
+            <a:pPr algn="ctr"/>
+            <a:endParaRPr kumimoji="1" lang="ko-Kore-KR" altLang="en-US" dirty="0"/>
+          </a:p>
+        </p:txBody>
+      </p:sp>
+      <p:sp>
+        <p:nvSpPr>
+          <p:cNvPr id="2" name="TextBox 1">
+            <a:extLst>
+              <a:ext uri="{FF2B5EF4-FFF2-40B4-BE49-F238E27FC236}">
+                <a16:creationId xmlns:a16="http://schemas.microsoft.com/office/drawing/2014/main" id="{809E3B69-C23C-595C-ACCC-5B271E69E3E6}"/>
+              </a:ext>
+            </a:extLst>
+          </p:cNvPr>
+          <p:cNvSpPr txBox="1"/>
+          <p:nvPr/>
+        </p:nvSpPr>
+        <p:spPr>
+          <a:xfrm>
+            <a:off x="260127" y="3148428"/>
+            <a:ext cx="1061545" cy="369332"/>
+          </a:xfrm>
+          <a:prstGeom prst="rect">
+            <a:avLst/>
+          </a:prstGeom>
+        </p:spPr>
+        <p:style>
+          <a:lnRef idx="3">
+            <a:schemeClr val="lt1"/>
+          </a:lnRef>
+          <a:fillRef idx="1">
+            <a:schemeClr val="accent4"/>
+          </a:fillRef>
+          <a:effectRef idx="1">
+            <a:schemeClr val="accent4"/>
+          </a:effectRef>
+          <a:fontRef idx="minor">
+            <a:schemeClr val="lt1"/>
+          </a:fontRef>
+        </p:style>
+        <p:txBody>
+          <a:bodyPr wrap="square" rtlCol="0">
+            <a:spAutoFit/>
+          </a:bodyPr>
+          <a:lstStyle/>
+          <a:p>
+            <a:r>
+              <a:rPr kumimoji="1" lang="en-US" altLang="ko-Kore-KR" dirty="0"/>
+              <a:t>Test01</a:t>
+            </a:r>
+            <a:endParaRPr kumimoji="1" lang="ko-Kore-KR" altLang="en-US" dirty="0"/>
+          </a:p>
+        </p:txBody>
+      </p:sp>
+      <p:cxnSp>
+        <p:nvCxnSpPr>
+          <p:cNvPr id="3" name="직선 화살표 연결선 2">
+            <a:extLst>
+              <a:ext uri="{FF2B5EF4-FFF2-40B4-BE49-F238E27FC236}">
+                <a16:creationId xmlns:a16="http://schemas.microsoft.com/office/drawing/2014/main" id="{60DD03A1-886B-E8EC-9891-53E88182A651}"/>
+              </a:ext>
+            </a:extLst>
+          </p:cNvPr>
+          <p:cNvCxnSpPr>
+            <a:cxnSpLocks/>
+            <a:stCxn id="2" idx="3"/>
+            <a:endCxn id="4" idx="1"/>
+          </p:cNvCxnSpPr>
+          <p:nvPr/>
+        </p:nvCxnSpPr>
+        <p:spPr>
+          <a:xfrm flipV="1">
+            <a:off x="1321672" y="1912885"/>
+            <a:ext cx="1826822" cy="1420209"/>
+          </a:xfrm>
+          <a:prstGeom prst="straightConnector1">
+            <a:avLst/>
+          </a:prstGeom>
+          <a:ln>
+            <a:tailEnd type="triangle"/>
+          </a:ln>
+        </p:spPr>
+        <p:style>
+          <a:lnRef idx="3">
+            <a:schemeClr val="accent4"/>
+          </a:lnRef>
+          <a:fillRef idx="0">
+            <a:schemeClr val="accent4"/>
+          </a:fillRef>
+          <a:effectRef idx="2">
+            <a:schemeClr val="accent4"/>
+          </a:effectRef>
+          <a:fontRef idx="minor">
+            <a:schemeClr val="tx1"/>
+          </a:fontRef>
+        </p:style>
+      </p:cxnSp>
+      <p:cxnSp>
+        <p:nvCxnSpPr>
+          <p:cNvPr id="11" name="직선 화살표 연결선 10">
+            <a:extLst>
+              <a:ext uri="{FF2B5EF4-FFF2-40B4-BE49-F238E27FC236}">
+                <a16:creationId xmlns:a16="http://schemas.microsoft.com/office/drawing/2014/main" id="{2B2D4080-FC4C-F72C-90C9-6C762DBB33C6}"/>
+              </a:ext>
+            </a:extLst>
+          </p:cNvPr>
+          <p:cNvCxnSpPr>
+            <a:cxnSpLocks/>
+            <a:stCxn id="2" idx="3"/>
+            <a:endCxn id="7" idx="1"/>
+          </p:cNvCxnSpPr>
+          <p:nvPr/>
+        </p:nvCxnSpPr>
+        <p:spPr>
+          <a:xfrm flipV="1">
+            <a:off x="1321672" y="2948154"/>
+            <a:ext cx="1826821" cy="384940"/>
+          </a:xfrm>
+          <a:prstGeom prst="straightConnector1">
+            <a:avLst/>
+          </a:prstGeom>
+          <a:ln>
+            <a:tailEnd type="triangle"/>
+          </a:ln>
+        </p:spPr>
+        <p:style>
+          <a:lnRef idx="3">
+            <a:schemeClr val="accent4"/>
+          </a:lnRef>
+          <a:fillRef idx="0">
+            <a:schemeClr val="accent4"/>
+          </a:fillRef>
+          <a:effectRef idx="2">
+            <a:schemeClr val="accent4"/>
+          </a:effectRef>
+          <a:fontRef idx="minor">
+            <a:schemeClr val="tx1"/>
+          </a:fontRef>
+        </p:style>
+      </p:cxnSp>
+      <p:cxnSp>
+        <p:nvCxnSpPr>
+          <p:cNvPr id="15" name="직선 화살표 연결선 14">
+            <a:extLst>
+              <a:ext uri="{FF2B5EF4-FFF2-40B4-BE49-F238E27FC236}">
+                <a16:creationId xmlns:a16="http://schemas.microsoft.com/office/drawing/2014/main" id="{4EDF7106-1773-A19B-FA36-08098E87CF24}"/>
+              </a:ext>
+            </a:extLst>
+          </p:cNvPr>
+          <p:cNvCxnSpPr>
+            <a:cxnSpLocks/>
+            <a:stCxn id="2" idx="3"/>
+            <a:endCxn id="8" idx="1"/>
+          </p:cNvCxnSpPr>
+          <p:nvPr/>
+        </p:nvCxnSpPr>
+        <p:spPr>
+          <a:xfrm>
+            <a:off x="1321672" y="3333094"/>
+            <a:ext cx="1826820" cy="696311"/>
+          </a:xfrm>
+          <a:prstGeom prst="straightConnector1">
+            <a:avLst/>
+          </a:prstGeom>
+          <a:ln>
+            <a:tailEnd type="triangle"/>
+          </a:ln>
+        </p:spPr>
+        <p:style>
+          <a:lnRef idx="3">
+            <a:schemeClr val="accent4"/>
+          </a:lnRef>
+          <a:fillRef idx="0">
+            <a:schemeClr val="accent4"/>
+          </a:fillRef>
+          <a:effectRef idx="2">
+            <a:schemeClr val="accent4"/>
+          </a:effectRef>
+          <a:fontRef idx="minor">
+            <a:schemeClr val="tx1"/>
+          </a:fontRef>
+        </p:style>
+      </p:cxnSp>
+      <p:cxnSp>
+        <p:nvCxnSpPr>
+          <p:cNvPr id="20" name="직선 화살표 연결선 19">
+            <a:extLst>
+              <a:ext uri="{FF2B5EF4-FFF2-40B4-BE49-F238E27FC236}">
+                <a16:creationId xmlns:a16="http://schemas.microsoft.com/office/drawing/2014/main" id="{08EB027B-4E4A-49CA-ACE9-6B2F3A9A42CA}"/>
+              </a:ext>
+            </a:extLst>
+          </p:cNvPr>
+          <p:cNvCxnSpPr>
+            <a:cxnSpLocks/>
+            <a:stCxn id="2" idx="3"/>
+            <a:endCxn id="9" idx="1"/>
+          </p:cNvCxnSpPr>
+          <p:nvPr/>
+        </p:nvCxnSpPr>
+        <p:spPr>
+          <a:xfrm>
+            <a:off x="1321672" y="3333094"/>
+            <a:ext cx="1826820" cy="1731580"/>
+          </a:xfrm>
+          <a:prstGeom prst="straightConnector1">
+            <a:avLst/>
+          </a:prstGeom>
+          <a:ln>
+            <a:tailEnd type="triangle"/>
+          </a:ln>
+        </p:spPr>
+        <p:style>
+          <a:lnRef idx="3">
+            <a:schemeClr val="accent4"/>
+          </a:lnRef>
+          <a:fillRef idx="0">
+            <a:schemeClr val="accent4"/>
+          </a:fillRef>
+          <a:effectRef idx="2">
+            <a:schemeClr val="accent4"/>
+          </a:effectRef>
+          <a:fontRef idx="minor">
+            <a:schemeClr val="tx1"/>
+          </a:fontRef>
+        </p:style>
+      </p:cxnSp>
+      <p:cxnSp>
+        <p:nvCxnSpPr>
+          <p:cNvPr id="23" name="직선 화살표 연결선 22">
+            <a:extLst>
+              <a:ext uri="{FF2B5EF4-FFF2-40B4-BE49-F238E27FC236}">
+                <a16:creationId xmlns:a16="http://schemas.microsoft.com/office/drawing/2014/main" id="{27E6CE55-5EA1-4011-C28F-9CD10E6E327B}"/>
+              </a:ext>
+            </a:extLst>
+          </p:cNvPr>
+          <p:cNvCxnSpPr>
+            <a:cxnSpLocks/>
+            <a:stCxn id="2" idx="3"/>
+            <a:endCxn id="10" idx="1"/>
+          </p:cNvCxnSpPr>
+          <p:nvPr/>
+        </p:nvCxnSpPr>
+        <p:spPr>
+          <a:xfrm>
+            <a:off x="1321672" y="3333094"/>
+            <a:ext cx="1826820" cy="2812831"/>
+          </a:xfrm>
+          <a:prstGeom prst="straightConnector1">
+            <a:avLst/>
+          </a:prstGeom>
+          <a:ln>
+            <a:tailEnd type="triangle"/>
+          </a:ln>
+        </p:spPr>
+        <p:style>
+          <a:lnRef idx="3">
+            <a:schemeClr val="accent4"/>
+          </a:lnRef>
+          <a:fillRef idx="0">
+            <a:schemeClr val="accent4"/>
+          </a:fillRef>
+          <a:effectRef idx="2">
+            <a:schemeClr val="accent4"/>
+          </a:effectRef>
+          <a:fontRef idx="minor">
+            <a:schemeClr val="tx1"/>
+          </a:fontRef>
+        </p:style>
+      </p:cxnSp>
+      <p:sp>
+        <p:nvSpPr>
+          <p:cNvPr id="67" name="TextBox 66">
+            <a:extLst>
+              <a:ext uri="{FF2B5EF4-FFF2-40B4-BE49-F238E27FC236}">
+                <a16:creationId xmlns:a16="http://schemas.microsoft.com/office/drawing/2014/main" id="{D207901C-F934-F799-A42D-9DF214C47C2A}"/>
+              </a:ext>
+            </a:extLst>
+          </p:cNvPr>
+          <p:cNvSpPr txBox="1"/>
+          <p:nvPr/>
+        </p:nvSpPr>
+        <p:spPr>
+          <a:xfrm>
+            <a:off x="7306663" y="3844739"/>
+            <a:ext cx="1061545" cy="369332"/>
+          </a:xfrm>
+          <a:prstGeom prst="rect">
+            <a:avLst/>
+          </a:prstGeom>
+        </p:spPr>
+        <p:style>
+          <a:lnRef idx="3">
+            <a:schemeClr val="lt1"/>
+          </a:lnRef>
+          <a:fillRef idx="1">
+            <a:schemeClr val="accent4"/>
+          </a:fillRef>
+          <a:effectRef idx="1">
+            <a:schemeClr val="accent4"/>
+          </a:effectRef>
+          <a:fontRef idx="minor">
+            <a:schemeClr val="lt1"/>
+          </a:fontRef>
+        </p:style>
+        <p:txBody>
+          <a:bodyPr wrap="square" rtlCol="0">
+            <a:spAutoFit/>
+          </a:bodyPr>
+          <a:lstStyle/>
+          <a:p>
+            <a:r>
+              <a:rPr kumimoji="1" lang="en-US" altLang="ko-Kore-KR" dirty="0"/>
+              <a:t>Test01</a:t>
+            </a:r>
+            <a:endParaRPr kumimoji="1" lang="ko-Kore-KR" altLang="en-US" dirty="0"/>
+          </a:p>
+        </p:txBody>
+      </p:sp>
+      <p:cxnSp>
+        <p:nvCxnSpPr>
+          <p:cNvPr id="68" name="직선 화살표 연결선 67">
+            <a:extLst>
+              <a:ext uri="{FF2B5EF4-FFF2-40B4-BE49-F238E27FC236}">
+                <a16:creationId xmlns:a16="http://schemas.microsoft.com/office/drawing/2014/main" id="{44A23A50-A904-414F-50E6-212891E1A805}"/>
+              </a:ext>
+            </a:extLst>
+          </p:cNvPr>
+          <p:cNvCxnSpPr>
+            <a:cxnSpLocks/>
+            <a:stCxn id="67" idx="3"/>
+            <a:endCxn id="18" idx="1"/>
+          </p:cNvCxnSpPr>
+          <p:nvPr/>
+        </p:nvCxnSpPr>
+        <p:spPr>
+          <a:xfrm flipV="1">
+            <a:off x="8368208" y="4029404"/>
+            <a:ext cx="878928" cy="1"/>
+          </a:xfrm>
+          <a:prstGeom prst="straightConnector1">
+            <a:avLst/>
+          </a:prstGeom>
+          <a:ln>
+            <a:tailEnd type="triangle"/>
+          </a:ln>
+        </p:spPr>
+        <p:style>
+          <a:lnRef idx="3">
+            <a:schemeClr val="accent4"/>
+          </a:lnRef>
+          <a:fillRef idx="0">
+            <a:schemeClr val="accent4"/>
+          </a:fillRef>
+          <a:effectRef idx="2">
+            <a:schemeClr val="accent4"/>
+          </a:effectRef>
+          <a:fontRef idx="minor">
+            <a:schemeClr val="tx1"/>
+          </a:fontRef>
+        </p:style>
+      </p:cxnSp>
+      <p:sp>
+        <p:nvSpPr>
+          <p:cNvPr id="73" name="오른쪽 화살표[R] 72">
+            <a:extLst>
+              <a:ext uri="{FF2B5EF4-FFF2-40B4-BE49-F238E27FC236}">
+                <a16:creationId xmlns:a16="http://schemas.microsoft.com/office/drawing/2014/main" id="{8E553B3C-0826-194A-821C-9C30B72232A8}"/>
+              </a:ext>
+            </a:extLst>
+          </p:cNvPr>
+          <p:cNvSpPr/>
+          <p:nvPr/>
+        </p:nvSpPr>
+        <p:spPr>
+          <a:xfrm>
+            <a:off x="5709085" y="3690446"/>
+            <a:ext cx="1177158" cy="677917"/>
+          </a:xfrm>
+          <a:prstGeom prst="rightArrow">
+            <a:avLst/>
+          </a:prstGeom>
+          <a:solidFill>
+            <a:schemeClr val="bg1"/>
+          </a:solidFill>
+        </p:spPr>
+        <p:style>
+          <a:lnRef idx="2">
+            <a:schemeClr val="dk1">
+              <a:shade val="50000"/>
+            </a:schemeClr>
+          </a:lnRef>
+          <a:fillRef idx="1">
+            <a:schemeClr val="dk1"/>
+          </a:fillRef>
+          <a:effectRef idx="0">
+            <a:schemeClr val="dk1"/>
+          </a:effectRef>
+          <a:fontRef idx="minor">
+            <a:schemeClr val="lt1"/>
+          </a:fontRef>
+        </p:style>
+        <p:txBody>
+          <a:bodyPr rtlCol="0" anchor="ctr"/>
+          <a:lstStyle/>
+          <a:p>
+            <a:pPr algn="ctr"/>
+            <a:endParaRPr kumimoji="1" lang="ko-Kore-KR" altLang="en-US"/>
+          </a:p>
+        </p:txBody>
+      </p:sp>
+      <p:sp>
+        <p:nvSpPr>
+          <p:cNvPr id="74" name="직사각형 73">
+            <a:extLst>
+              <a:ext uri="{FF2B5EF4-FFF2-40B4-BE49-F238E27FC236}">
+                <a16:creationId xmlns:a16="http://schemas.microsoft.com/office/drawing/2014/main" id="{D6CF5554-4137-4C9F-4556-DFFC1ED4AFFC}"/>
+              </a:ext>
+            </a:extLst>
+          </p:cNvPr>
+          <p:cNvSpPr/>
+          <p:nvPr/>
+        </p:nvSpPr>
+        <p:spPr>
+          <a:xfrm>
+            <a:off x="3304179" y="95219"/>
+            <a:ext cx="1828801" cy="677917"/>
+          </a:xfrm>
+          <a:prstGeom prst="rect">
+            <a:avLst/>
+          </a:prstGeom>
+        </p:spPr>
+        <p:style>
+          <a:lnRef idx="3">
+            <a:schemeClr val="lt1"/>
+          </a:lnRef>
+          <a:fillRef idx="1">
+            <a:schemeClr val="accent3"/>
+          </a:fillRef>
+          <a:effectRef idx="1">
+            <a:schemeClr val="accent3"/>
+          </a:effectRef>
+          <a:fontRef idx="minor">
+            <a:schemeClr val="lt1"/>
+          </a:fontRef>
+        </p:style>
+        <p:txBody>
+          <a:bodyPr rtlCol="0" anchor="ctr"/>
+          <a:lstStyle/>
+          <a:p>
+            <a:pPr algn="ctr"/>
+            <a:r>
+              <a:rPr kumimoji="1" lang="en-US" altLang="ko-Kore-KR" dirty="0"/>
+              <a:t>&lt;&lt;Interface&gt;&gt;</a:t>
+            </a:r>
+          </a:p>
+          <a:p>
+            <a:pPr algn="ctr"/>
+            <a:r>
+              <a:rPr kumimoji="1" lang="en-US" altLang="ko-Kore-KR" dirty="0"/>
+              <a:t>Iterator</a:t>
+            </a:r>
+            <a:endParaRPr kumimoji="1" lang="ko-Kore-KR" altLang="en-US" dirty="0"/>
+          </a:p>
+        </p:txBody>
+      </p:sp>
+      <p:sp>
+        <p:nvSpPr>
+          <p:cNvPr id="76" name="삼각형 75">
+            <a:extLst>
+              <a:ext uri="{FF2B5EF4-FFF2-40B4-BE49-F238E27FC236}">
+                <a16:creationId xmlns:a16="http://schemas.microsoft.com/office/drawing/2014/main" id="{14C48F61-226C-4A28-4BA5-89259ED02001}"/>
+              </a:ext>
+            </a:extLst>
+          </p:cNvPr>
+          <p:cNvSpPr/>
+          <p:nvPr/>
+        </p:nvSpPr>
+        <p:spPr>
+          <a:xfrm>
+            <a:off x="4097709" y="799502"/>
+            <a:ext cx="241738" cy="208395"/>
+          </a:xfrm>
+          <a:prstGeom prst="triangle">
+            <a:avLst/>
+          </a:prstGeom>
+        </p:spPr>
+        <p:style>
+          <a:lnRef idx="2">
+            <a:schemeClr val="accent3">
+              <a:shade val="50000"/>
+            </a:schemeClr>
+          </a:lnRef>
+          <a:fillRef idx="1">
+            <a:schemeClr val="accent3"/>
+          </a:fillRef>
+          <a:effectRef idx="0">
+            <a:schemeClr val="accent3"/>
+          </a:effectRef>
+          <a:fontRef idx="minor">
+            <a:schemeClr val="lt1"/>
+          </a:fontRef>
+        </p:style>
+        <p:txBody>
+          <a:bodyPr rtlCol="0" anchor="ctr"/>
+          <a:lstStyle/>
+          <a:p>
+            <a:pPr algn="ctr"/>
+            <a:endParaRPr kumimoji="1" lang="ko-Kore-KR" altLang="en-US"/>
           </a:p>
         </p:txBody>
       </p:sp>
     </p:spTree>
     <p:extLst>
       <p:ext uri="{BB962C8B-B14F-4D97-AF65-F5344CB8AC3E}">
-        <p14:creationId xmlns:p14="http://schemas.microsoft.com/office/powerpoint/2010/main" val="80368960"/>
+        <p14:creationId xmlns:p14="http://schemas.microsoft.com/office/powerpoint/2010/main" val="4272082683"/>
       </p:ext>
     </p:extLst>
   </p:cSld>

</xml_diff>